<commit_message>
update slides move previous slides to correct subdiretory
</commit_message>
<xml_diff>
--- a/presentations/20131113 ACH project2.pptx
+++ b/presentations/20131113 ACH project2.pptx
@@ -5,7 +5,7 @@
     <p:sldMasterId id="2147483648" r:id="rId1"/>
   </p:sldMasterIdLst>
   <p:notesMasterIdLst>
-    <p:notesMasterId r:id="rId26"/>
+    <p:notesMasterId r:id="rId27"/>
   </p:notesMasterIdLst>
   <p:sldIdLst>
     <p:sldId id="256" r:id="rId2"/>
@@ -16,22 +16,23 @@
     <p:sldId id="267" r:id="rId7"/>
     <p:sldId id="284" r:id="rId8"/>
     <p:sldId id="268" r:id="rId9"/>
-    <p:sldId id="269" r:id="rId10"/>
-    <p:sldId id="270" r:id="rId11"/>
-    <p:sldId id="281" r:id="rId12"/>
-    <p:sldId id="282" r:id="rId13"/>
-    <p:sldId id="273" r:id="rId14"/>
-    <p:sldId id="272" r:id="rId15"/>
-    <p:sldId id="274" r:id="rId16"/>
-    <p:sldId id="277" r:id="rId17"/>
-    <p:sldId id="279" r:id="rId18"/>
-    <p:sldId id="283" r:id="rId19"/>
-    <p:sldId id="278" r:id="rId20"/>
-    <p:sldId id="264" r:id="rId21"/>
-    <p:sldId id="280" r:id="rId22"/>
-    <p:sldId id="262" r:id="rId23"/>
-    <p:sldId id="275" r:id="rId24"/>
-    <p:sldId id="276" r:id="rId25"/>
+    <p:sldId id="285" r:id="rId10"/>
+    <p:sldId id="269" r:id="rId11"/>
+    <p:sldId id="270" r:id="rId12"/>
+    <p:sldId id="281" r:id="rId13"/>
+    <p:sldId id="282" r:id="rId14"/>
+    <p:sldId id="273" r:id="rId15"/>
+    <p:sldId id="272" r:id="rId16"/>
+    <p:sldId id="274" r:id="rId17"/>
+    <p:sldId id="277" r:id="rId18"/>
+    <p:sldId id="279" r:id="rId19"/>
+    <p:sldId id="283" r:id="rId20"/>
+    <p:sldId id="278" r:id="rId21"/>
+    <p:sldId id="264" r:id="rId22"/>
+    <p:sldId id="280" r:id="rId23"/>
+    <p:sldId id="262" r:id="rId24"/>
+    <p:sldId id="275" r:id="rId25"/>
+    <p:sldId id="276" r:id="rId26"/>
   </p:sldIdLst>
   <p:sldSz cx="9144000" cy="6858000" type="screen4x3"/>
   <p:notesSz cx="6858000" cy="9144000"/>
@@ -3702,23 +3703,11 @@
             </a:r>
             <a:r>
               <a:rPr lang="de-DE" dirty="0" err="1" smtClean="0"/>
-              <a:t>general</a:t>
-            </a:r>
-            <a:r>
-              <a:rPr lang="de-DE" dirty="0" smtClean="0"/>
-              <a:t> </a:t>
-            </a:r>
-            <a:r>
-              <a:rPr lang="de-DE" dirty="0" err="1" smtClean="0"/>
               <a:t>thoughts</a:t>
             </a:r>
             <a:r>
               <a:rPr lang="de-DE" dirty="0" smtClean="0"/>
-              <a:t> on </a:t>
-            </a:r>
-            <a:r>
-              <a:rPr lang="de-DE" dirty="0" err="1" smtClean="0"/>
-              <a:t>settings</a:t>
+              <a:t> on ECC</a:t>
             </a:r>
             <a:endParaRPr lang="de-DE" dirty="0"/>
           </a:p>
@@ -3731,7 +3720,7 @@
             <a:spLocks noGrp="1"/>
           </p:cNvSpPr>
           <p:nvPr>
-            <p:ph idx="1"/>
+            <p:ph type="body" idx="1"/>
           </p:nvPr>
         </p:nvSpPr>
         <p:spPr/>
@@ -3741,72 +3730,16 @@
           <a:p>
             <a:r>
               <a:rPr lang="de-DE" dirty="0" smtClean="0"/>
-              <a:t>(Ramin, Adi)</a:t>
-            </a:r>
-          </a:p>
-          <a:p>
-            <a:r>
-              <a:rPr lang="de-DE" dirty="0" smtClean="0"/>
-              <a:t>Variant A: </a:t>
-            </a:r>
-            <a:r>
-              <a:rPr lang="de-DE" dirty="0" err="1" smtClean="0"/>
-              <a:t>fewer</a:t>
-            </a:r>
-            <a:r>
-              <a:rPr lang="de-DE" dirty="0" smtClean="0"/>
-              <a:t> </a:t>
-            </a:r>
-            <a:r>
-              <a:rPr lang="de-DE" dirty="0" err="1" smtClean="0"/>
-              <a:t>supported</a:t>
-            </a:r>
-            <a:r>
-              <a:rPr lang="de-DE" dirty="0" smtClean="0"/>
-              <a:t> </a:t>
-            </a:r>
-            <a:r>
-              <a:rPr lang="de-DE" dirty="0" err="1" smtClean="0"/>
-              <a:t>clients</a:t>
-            </a:r>
-            <a:endParaRPr lang="de-DE" dirty="0" smtClean="0"/>
-          </a:p>
-          <a:p>
-            <a:r>
-              <a:rPr lang="de-DE" dirty="0" smtClean="0"/>
-              <a:t>Variant B: </a:t>
-            </a:r>
-            <a:r>
-              <a:rPr lang="de-DE" dirty="0" err="1" smtClean="0"/>
-              <a:t>more</a:t>
-            </a:r>
-            <a:r>
-              <a:rPr lang="de-DE" dirty="0" smtClean="0"/>
-              <a:t> </a:t>
-            </a:r>
-            <a:r>
-              <a:rPr lang="de-DE" dirty="0" err="1" smtClean="0"/>
-              <a:t>clients</a:t>
-            </a:r>
-            <a:r>
-              <a:rPr lang="de-DE" dirty="0" smtClean="0"/>
-              <a:t>, </a:t>
-            </a:r>
-            <a:r>
-              <a:rPr lang="de-DE" dirty="0" err="1" smtClean="0"/>
-              <a:t>weaker</a:t>
-            </a:r>
-            <a:r>
-              <a:rPr lang="de-DE" dirty="0" smtClean="0"/>
-              <a:t> </a:t>
-            </a:r>
-            <a:r>
-              <a:rPr lang="de-DE" dirty="0" err="1" smtClean="0"/>
-              <a:t>settings</a:t>
-            </a:r>
-            <a:endParaRPr lang="de-DE" dirty="0" smtClean="0"/>
-          </a:p>
-          <a:p>
+              <a:t>(</a:t>
+            </a:r>
+            <a:r>
+              <a:rPr lang="de-DE" dirty="0" err="1" smtClean="0"/>
+              <a:t>Azet</a:t>
+            </a:r>
+            <a:r>
+              <a:rPr lang="de-DE" dirty="0" smtClean="0"/>
+              <a:t>)</a:t>
+            </a:r>
             <a:endParaRPr lang="de-DE" dirty="0"/>
           </a:p>
         </p:txBody>
@@ -3814,13 +3747,20 @@
     </p:spTree>
     <p:extLst>
       <p:ext uri="{BB962C8B-B14F-4D97-AF65-F5344CB8AC3E}">
-        <p14:creationId xmlns:p14="http://schemas.microsoft.com/office/powerpoint/2010/main" val="667245678"/>
+        <p14:creationId xmlns:p14="http://schemas.microsoft.com/office/powerpoint/2010/main" val="3561811505"/>
       </p:ext>
     </p:extLst>
   </p:cSld>
   <p:clrMapOvr>
     <a:masterClrMapping/>
   </p:clrMapOvr>
+  <p:timing>
+    <p:tnLst>
+      <p:par>
+        <p:cTn xmlns:p14="http://schemas.microsoft.com/office/powerpoint/2010/main" id="1" dur="indefinite" restart="never" nodeType="tmRoot"/>
+      </p:par>
+    </p:tnLst>
+  </p:timing>
 </p:sld>
 </file>
 
@@ -3857,50 +3797,141 @@
           <a:lstStyle/>
           <a:p>
             <a:r>
-              <a:rPr lang="de-DE" dirty="0" smtClean="0"/>
-              <a:t>Strong </a:t>
+              <a:rPr lang="de-DE" dirty="0" err="1" smtClean="0"/>
+              <a:t>Some</a:t>
+            </a:r>
+            <a:r>
+              <a:rPr lang="de-DE" dirty="0" smtClean="0"/>
+              <a:t> </a:t>
+            </a:r>
+            <a:r>
+              <a:rPr lang="de-DE" dirty="0" err="1" smtClean="0"/>
+              <a:t>general</a:t>
+            </a:r>
+            <a:r>
+              <a:rPr lang="de-DE" dirty="0" smtClean="0"/>
+              <a:t> </a:t>
+            </a:r>
+            <a:r>
+              <a:rPr lang="de-DE" dirty="0" err="1" smtClean="0"/>
+              <a:t>thoughts</a:t>
+            </a:r>
+            <a:r>
+              <a:rPr lang="de-DE" dirty="0" smtClean="0"/>
+              <a:t> on </a:t>
             </a:r>
             <a:r>
               <a:rPr lang="de-DE" dirty="0" err="1" smtClean="0"/>
               <a:t>settings</a:t>
             </a:r>
-            <a:r>
-              <a:rPr lang="de-DE" dirty="0" smtClean="0"/>
-              <a:t>. Variant A</a:t>
-            </a:r>
             <a:endParaRPr lang="de-DE" dirty="0"/>
           </a:p>
         </p:txBody>
       </p:sp>
-      <p:pic>
-        <p:nvPicPr>
-          <p:cNvPr id="4" name="Inhaltsplatzhalter 3"/>
-          <p:cNvPicPr>
-            <a:picLocks noGrp="1" noChangeAspect="1"/>
-          </p:cNvPicPr>
+      <p:sp>
+        <p:nvSpPr>
+          <p:cNvPr id="3" name="Inhaltsplatzhalter 2"/>
+          <p:cNvSpPr>
+            <a:spLocks noGrp="1"/>
+          </p:cNvSpPr>
           <p:nvPr>
             <p:ph idx="1"/>
           </p:nvPr>
-        </p:nvPicPr>
-        <p:blipFill>
-          <a:blip r:embed="rId2"/>
-          <a:srcRect t="-86936" b="-86936"/>
-          <a:stretch>
-            <a:fillRect/>
-          </a:stretch>
-        </p:blipFill>
-        <p:spPr/>
-      </p:pic>
+        </p:nvSpPr>
+        <p:spPr/>
+        <p:txBody>
+          <a:bodyPr/>
+          <a:lstStyle/>
+          <a:p>
+            <a:r>
+              <a:rPr lang="de-DE" dirty="0" smtClean="0"/>
+              <a:t>(Ramin, Adi)</a:t>
+            </a:r>
+          </a:p>
+          <a:p>
+            <a:r>
+              <a:rPr lang="de-DE" dirty="0" smtClean="0"/>
+              <a:t>Variant A: </a:t>
+            </a:r>
+            <a:r>
+              <a:rPr lang="de-DE" dirty="0" err="1" smtClean="0"/>
+              <a:t>fewer</a:t>
+            </a:r>
+            <a:r>
+              <a:rPr lang="de-DE" dirty="0" smtClean="0"/>
+              <a:t> </a:t>
+            </a:r>
+            <a:r>
+              <a:rPr lang="de-DE" dirty="0" err="1" smtClean="0"/>
+              <a:t>supported</a:t>
+            </a:r>
+            <a:r>
+              <a:rPr lang="de-DE" dirty="0" smtClean="0"/>
+              <a:t> </a:t>
+            </a:r>
+            <a:r>
+              <a:rPr lang="de-DE" dirty="0" err="1" smtClean="0"/>
+              <a:t>clients</a:t>
+            </a:r>
+            <a:endParaRPr lang="de-DE" dirty="0" smtClean="0"/>
+          </a:p>
+          <a:p>
+            <a:r>
+              <a:rPr lang="de-DE" dirty="0" smtClean="0"/>
+              <a:t>Variant B: </a:t>
+            </a:r>
+            <a:r>
+              <a:rPr lang="de-DE" dirty="0" err="1" smtClean="0"/>
+              <a:t>more</a:t>
+            </a:r>
+            <a:r>
+              <a:rPr lang="de-DE" dirty="0" smtClean="0"/>
+              <a:t> </a:t>
+            </a:r>
+            <a:r>
+              <a:rPr lang="de-DE" dirty="0" err="1" smtClean="0"/>
+              <a:t>clients</a:t>
+            </a:r>
+            <a:r>
+              <a:rPr lang="de-DE" dirty="0" smtClean="0"/>
+              <a:t>, </a:t>
+            </a:r>
+            <a:r>
+              <a:rPr lang="de-DE" dirty="0" err="1" smtClean="0"/>
+              <a:t>weaker</a:t>
+            </a:r>
+            <a:r>
+              <a:rPr lang="de-DE" dirty="0" smtClean="0"/>
+              <a:t> </a:t>
+            </a:r>
+            <a:r>
+              <a:rPr lang="de-DE" dirty="0" err="1" smtClean="0"/>
+              <a:t>settings</a:t>
+            </a:r>
+            <a:endParaRPr lang="de-DE" dirty="0" smtClean="0"/>
+          </a:p>
+          <a:p>
+            <a:endParaRPr lang="de-DE" dirty="0"/>
+          </a:p>
+        </p:txBody>
+      </p:sp>
     </p:spTree>
     <p:extLst>
       <p:ext uri="{BB962C8B-B14F-4D97-AF65-F5344CB8AC3E}">
-        <p14:creationId xmlns:p14="http://schemas.microsoft.com/office/powerpoint/2010/main" val="3812766745"/>
+        <p14:creationId xmlns:p14="http://schemas.microsoft.com/office/powerpoint/2010/main" val="667245678"/>
       </p:ext>
     </p:extLst>
   </p:cSld>
   <p:clrMapOvr>
     <a:masterClrMapping/>
   </p:clrMapOvr>
+  <p:timing>
+    <p:tnLst>
+      <p:par>
+        <p:cTn xmlns:p14="http://schemas.microsoft.com/office/powerpoint/2010/main" id="1" dur="indefinite" restart="never" nodeType="tmRoot"/>
+      </p:par>
+    </p:tnLst>
+  </p:timing>
 </p:sld>
 </file>
 
@@ -3933,26 +3964,12 @@
         </p:nvSpPr>
         <p:spPr/>
         <p:txBody>
-          <a:bodyPr>
-            <a:normAutofit fontScale="90000"/>
-          </a:bodyPr>
-          <a:lstStyle/>
-          <a:p>
-            <a:r>
-              <a:rPr lang="de-DE" dirty="0" err="1" smtClean="0"/>
-              <a:t>Weaker</a:t>
-            </a:r>
-            <a:r>
-              <a:rPr lang="de-DE" dirty="0" smtClean="0"/>
-              <a:t>, </a:t>
-            </a:r>
-            <a:r>
-              <a:rPr lang="de-DE" dirty="0" err="1" smtClean="0"/>
-              <a:t>compatible</a:t>
-            </a:r>
-            <a:r>
-              <a:rPr lang="de-DE" dirty="0" smtClean="0"/>
-              <a:t> </a:t>
+          <a:bodyPr/>
+          <a:lstStyle/>
+          <a:p>
+            <a:r>
+              <a:rPr lang="de-DE" dirty="0" smtClean="0"/>
+              <a:t>Strong </a:t>
             </a:r>
             <a:r>
               <a:rPr lang="de-DE" dirty="0" err="1" smtClean="0"/>
@@ -3960,7 +3977,7 @@
             </a:r>
             <a:r>
               <a:rPr lang="de-DE" dirty="0" smtClean="0"/>
-              <a:t>, Variant B</a:t>
+              <a:t>. Variant A</a:t>
             </a:r>
             <a:endParaRPr lang="de-DE" dirty="0"/>
           </a:p>
@@ -3978,7 +3995,7 @@
         </p:nvPicPr>
         <p:blipFill>
           <a:blip r:embed="rId2"/>
-          <a:srcRect t="-28801" b="-28801"/>
+          <a:srcRect t="-86936" b="-86936"/>
           <a:stretch>
             <a:fillRect/>
           </a:stretch>
@@ -3988,13 +4005,20 @@
     </p:spTree>
     <p:extLst>
       <p:ext uri="{BB962C8B-B14F-4D97-AF65-F5344CB8AC3E}">
-        <p14:creationId xmlns:p14="http://schemas.microsoft.com/office/powerpoint/2010/main" val="3924263324"/>
+        <p14:creationId xmlns:p14="http://schemas.microsoft.com/office/powerpoint/2010/main" val="3812766745"/>
       </p:ext>
     </p:extLst>
   </p:cSld>
   <p:clrMapOvr>
     <a:masterClrMapping/>
   </p:clrMapOvr>
+  <p:timing>
+    <p:tnLst>
+      <p:par>
+        <p:cTn xmlns:p14="http://schemas.microsoft.com/office/powerpoint/2010/main" id="1" dur="indefinite" restart="never" nodeType="tmRoot"/>
+      </p:par>
+    </p:tnLst>
+  </p:timing>
 </p:sld>
 </file>
 
@@ -4028,58 +4052,74 @@
         <p:spPr/>
         <p:txBody>
           <a:bodyPr>
-            <a:normAutofit/>
+            <a:normAutofit fontScale="90000"/>
           </a:bodyPr>
           <a:lstStyle/>
           <a:p>
             <a:r>
-              <a:rPr lang="de-DE" dirty="0"/>
-              <a:t>Random </a:t>
-            </a:r>
-            <a:r>
-              <a:rPr lang="de-DE" dirty="0" err="1"/>
-              <a:t>Number</a:t>
-            </a:r>
-            <a:r>
-              <a:rPr lang="de-DE" dirty="0"/>
-              <a:t> Generators </a:t>
-            </a:r>
-          </a:p>
-        </p:txBody>
-      </p:sp>
-      <p:sp>
-        <p:nvSpPr>
-          <p:cNvPr id="3" name="Inhaltsplatzhalter 2"/>
-          <p:cNvSpPr>
-            <a:spLocks noGrp="1"/>
-          </p:cNvSpPr>
-          <p:nvPr>
-            <p:ph type="body" idx="1"/>
-          </p:nvPr>
-        </p:nvSpPr>
-        <p:spPr/>
-        <p:txBody>
-          <a:bodyPr/>
-          <a:lstStyle/>
-          <a:p>
-            <a:r>
-              <a:rPr lang="de-DE" dirty="0" err="1" smtClean="0"/>
-              <a:t>Azet</a:t>
+              <a:rPr lang="de-DE" dirty="0" err="1" smtClean="0"/>
+              <a:t>Weaker</a:t>
+            </a:r>
+            <a:r>
+              <a:rPr lang="de-DE" dirty="0" smtClean="0"/>
+              <a:t>, </a:t>
+            </a:r>
+            <a:r>
+              <a:rPr lang="de-DE" dirty="0" err="1" smtClean="0"/>
+              <a:t>compatible</a:t>
+            </a:r>
+            <a:r>
+              <a:rPr lang="de-DE" dirty="0" smtClean="0"/>
+              <a:t> </a:t>
+            </a:r>
+            <a:r>
+              <a:rPr lang="de-DE" dirty="0" err="1" smtClean="0"/>
+              <a:t>settings</a:t>
+            </a:r>
+            <a:r>
+              <a:rPr lang="de-DE" dirty="0" smtClean="0"/>
+              <a:t>, Variant B</a:t>
             </a:r>
             <a:endParaRPr lang="de-DE" dirty="0"/>
           </a:p>
         </p:txBody>
       </p:sp>
+      <p:pic>
+        <p:nvPicPr>
+          <p:cNvPr id="4" name="Inhaltsplatzhalter 3"/>
+          <p:cNvPicPr>
+            <a:picLocks noGrp="1" noChangeAspect="1"/>
+          </p:cNvPicPr>
+          <p:nvPr>
+            <p:ph idx="1"/>
+          </p:nvPr>
+        </p:nvPicPr>
+        <p:blipFill>
+          <a:blip r:embed="rId2"/>
+          <a:srcRect t="-28801" b="-28801"/>
+          <a:stretch>
+            <a:fillRect/>
+          </a:stretch>
+        </p:blipFill>
+        <p:spPr/>
+      </p:pic>
     </p:spTree>
     <p:extLst>
       <p:ext uri="{BB962C8B-B14F-4D97-AF65-F5344CB8AC3E}">
-        <p14:creationId xmlns:p14="http://schemas.microsoft.com/office/powerpoint/2010/main" val="1481597569"/>
+        <p14:creationId xmlns:p14="http://schemas.microsoft.com/office/powerpoint/2010/main" val="3924263324"/>
       </p:ext>
     </p:extLst>
   </p:cSld>
   <p:clrMapOvr>
     <a:masterClrMapping/>
   </p:clrMapOvr>
+  <p:timing>
+    <p:tnLst>
+      <p:par>
+        <p:cTn xmlns:p14="http://schemas.microsoft.com/office/powerpoint/2010/main" id="1" dur="indefinite" restart="never" nodeType="tmRoot"/>
+      </p:par>
+    </p:tnLst>
+  </p:timing>
 </p:sld>
 </file>
 
@@ -4112,43 +4152,44 @@
         </p:nvSpPr>
         <p:spPr/>
         <p:txBody>
+          <a:bodyPr>
+            <a:normAutofit/>
+          </a:bodyPr>
+          <a:lstStyle/>
+          <a:p>
+            <a:r>
+              <a:rPr lang="de-DE" dirty="0"/>
+              <a:t>Random </a:t>
+            </a:r>
+            <a:r>
+              <a:rPr lang="de-DE" dirty="0" err="1"/>
+              <a:t>Number</a:t>
+            </a:r>
+            <a:r>
+              <a:rPr lang="de-DE" dirty="0"/>
+              <a:t> Generators </a:t>
+            </a:r>
+          </a:p>
+        </p:txBody>
+      </p:sp>
+      <p:sp>
+        <p:nvSpPr>
+          <p:cNvPr id="3" name="Inhaltsplatzhalter 2"/>
+          <p:cNvSpPr>
+            <a:spLocks noGrp="1"/>
+          </p:cNvSpPr>
+          <p:nvPr>
+            <p:ph type="body" idx="1"/>
+          </p:nvPr>
+        </p:nvSpPr>
+        <p:spPr/>
+        <p:txBody>
           <a:bodyPr/>
           <a:lstStyle/>
           <a:p>
             <a:r>
               <a:rPr lang="de-DE" dirty="0" err="1" smtClean="0"/>
-              <a:t>Keylengths</a:t>
-            </a:r>
-            <a:endParaRPr lang="de-DE" dirty="0"/>
-          </a:p>
-        </p:txBody>
-      </p:sp>
-      <p:sp>
-        <p:nvSpPr>
-          <p:cNvPr id="3" name="Inhaltsplatzhalter 2"/>
-          <p:cNvSpPr>
-            <a:spLocks noGrp="1"/>
-          </p:cNvSpPr>
-          <p:nvPr>
-            <p:ph type="body" idx="1"/>
-          </p:nvPr>
-        </p:nvSpPr>
-        <p:spPr/>
-        <p:txBody>
-          <a:bodyPr/>
-          <a:lstStyle/>
-          <a:p>
-            <a:r>
-              <a:rPr lang="de-DE" dirty="0" smtClean="0"/>
-              <a:t>(cm, </a:t>
-            </a:r>
-            <a:r>
-              <a:rPr lang="de-DE" dirty="0" err="1" smtClean="0"/>
               <a:t>Azet</a:t>
-            </a:r>
-            <a:r>
-              <a:rPr lang="de-DE" dirty="0" smtClean="0"/>
-              <a:t>)</a:t>
             </a:r>
             <a:endParaRPr lang="de-DE" dirty="0"/>
           </a:p>
@@ -4157,13 +4198,20 @@
     </p:spTree>
     <p:extLst>
       <p:ext uri="{BB962C8B-B14F-4D97-AF65-F5344CB8AC3E}">
-        <p14:creationId xmlns:p14="http://schemas.microsoft.com/office/powerpoint/2010/main" val="665251807"/>
+        <p14:creationId xmlns:p14="http://schemas.microsoft.com/office/powerpoint/2010/main" val="1481597569"/>
       </p:ext>
     </p:extLst>
   </p:cSld>
   <p:clrMapOvr>
     <a:masterClrMapping/>
   </p:clrMapOvr>
+  <p:timing>
+    <p:tnLst>
+      <p:par>
+        <p:cTn xmlns:p14="http://schemas.microsoft.com/office/powerpoint/2010/main" id="1" dur="indefinite" restart="never" nodeType="tmRoot"/>
+      </p:par>
+    </p:tnLst>
+  </p:timing>
 </p:sld>
 </file>
 
@@ -4196,63 +4244,14 @@
         </p:nvSpPr>
         <p:spPr/>
         <p:txBody>
-          <a:bodyPr>
-            <a:normAutofit/>
-          </a:bodyPr>
-          <a:lstStyle/>
-          <a:p>
-            <a:r>
-              <a:rPr lang="de-DE" dirty="0"/>
-              <a:t>A </a:t>
-            </a:r>
-            <a:r>
-              <a:rPr lang="de-DE" dirty="0" err="1"/>
-              <a:t>brief</a:t>
-            </a:r>
-            <a:r>
-              <a:rPr lang="de-DE" dirty="0"/>
-              <a:t> </a:t>
-            </a:r>
-            <a:r>
-              <a:rPr lang="de-DE" dirty="0" err="1"/>
-              <a:t>overview</a:t>
-            </a:r>
-            <a:r>
-              <a:rPr lang="de-DE" dirty="0"/>
-              <a:t> of </a:t>
-            </a:r>
-            <a:r>
-              <a:rPr lang="de-DE" dirty="0" err="1"/>
-              <a:t>common</a:t>
-            </a:r>
-            <a:r>
-              <a:rPr lang="de-DE" dirty="0"/>
-              <a:t> </a:t>
-            </a:r>
-            <a:r>
-              <a:rPr lang="de-DE" dirty="0" err="1"/>
-              <a:t>crypto</a:t>
-            </a:r>
-            <a:r>
-              <a:rPr lang="de-DE" dirty="0"/>
-              <a:t> </a:t>
-            </a:r>
-            <a:r>
-              <a:rPr lang="de-DE" dirty="0" err="1"/>
-              <a:t>software</a:t>
-            </a:r>
-            <a:r>
-              <a:rPr lang="de-DE" dirty="0"/>
-              <a:t>: </a:t>
-            </a:r>
-            <a:r>
-              <a:rPr lang="de-DE" dirty="0" err="1"/>
-              <a:t>libraries</a:t>
-            </a:r>
-            <a:r>
-              <a:rPr lang="de-DE" dirty="0"/>
-              <a:t> </a:t>
-            </a:r>
+          <a:bodyPr/>
+          <a:lstStyle/>
+          <a:p>
+            <a:r>
+              <a:rPr lang="de-DE" dirty="0" err="1" smtClean="0"/>
+              <a:t>Keylengths</a:t>
+            </a:r>
+            <a:endParaRPr lang="de-DE" dirty="0"/>
           </a:p>
         </p:txBody>
       </p:sp>
@@ -4273,7 +4272,15 @@
           <a:p>
             <a:r>
               <a:rPr lang="de-DE" dirty="0" smtClean="0"/>
-              <a:t>(cm, Adi)</a:t>
+              <a:t>(cm, </a:t>
+            </a:r>
+            <a:r>
+              <a:rPr lang="de-DE" dirty="0" err="1" smtClean="0"/>
+              <a:t>Azet</a:t>
+            </a:r>
+            <a:r>
+              <a:rPr lang="de-DE" dirty="0" smtClean="0"/>
+              <a:t>)</a:t>
             </a:r>
             <a:endParaRPr lang="de-DE" dirty="0"/>
           </a:p>
@@ -4282,21 +4289,20 @@
     </p:spTree>
     <p:extLst>
       <p:ext uri="{BB962C8B-B14F-4D97-AF65-F5344CB8AC3E}">
-        <p14:creationId xmlns:p14="http://schemas.microsoft.com/office/powerpoint/2010/main" val="1750082607"/>
+        <p14:creationId xmlns:p14="http://schemas.microsoft.com/office/powerpoint/2010/main" val="665251807"/>
       </p:ext>
     </p:extLst>
   </p:cSld>
   <p:clrMapOvr>
     <a:masterClrMapping/>
   </p:clrMapOvr>
-  <mc:AlternateContent xmlns:mc="http://schemas.openxmlformats.org/markup-compatibility/2006">
-    <mc:Choice xmlns:p14="http://schemas.microsoft.com/office/powerpoint/2010/main" Requires="p14">
-      <p:transition spd="slow" p14:dur="2000"/>
-    </mc:Choice>
-    <mc:Fallback>
-      <p:transition xmlns:p14="http://schemas.microsoft.com/office/powerpoint/2010/main" spd="slow"/>
-    </mc:Fallback>
-  </mc:AlternateContent>
+  <p:timing>
+    <p:tnLst>
+      <p:par>
+        <p:cTn xmlns:p14="http://schemas.microsoft.com/office/powerpoint/2010/main" id="1" dur="indefinite" restart="never" nodeType="tmRoot"/>
+      </p:par>
+    </p:tnLst>
+  </p:timing>
 </p:sld>
 </file>
 
@@ -4335,18 +4341,57 @@
           <a:lstStyle/>
           <a:p>
             <a:r>
+              <a:rPr lang="de-DE" dirty="0"/>
+              <a:t>A </a:t>
+            </a:r>
+            <a:r>
               <a:rPr lang="de-DE" dirty="0" err="1"/>
-              <a:t>Attacks</a:t>
+              <a:t>brief</a:t>
             </a:r>
             <a:r>
               <a:rPr lang="de-DE" dirty="0"/>
-              <a:t>: BEAST, CRIME etc</a:t>
-            </a:r>
-            <a:r>
-              <a:rPr lang="de-DE" dirty="0" smtClean="0"/>
-              <a:t>.</a:t>
-            </a:r>
-            <a:endParaRPr lang="de-DE" dirty="0"/>
+              <a:t> </a:t>
+            </a:r>
+            <a:r>
+              <a:rPr lang="de-DE" dirty="0" err="1"/>
+              <a:t>overview</a:t>
+            </a:r>
+            <a:r>
+              <a:rPr lang="de-DE" dirty="0"/>
+              <a:t> of </a:t>
+            </a:r>
+            <a:r>
+              <a:rPr lang="de-DE" dirty="0" err="1"/>
+              <a:t>common</a:t>
+            </a:r>
+            <a:r>
+              <a:rPr lang="de-DE" dirty="0"/>
+              <a:t> </a:t>
+            </a:r>
+            <a:r>
+              <a:rPr lang="de-DE" dirty="0" err="1"/>
+              <a:t>crypto</a:t>
+            </a:r>
+            <a:r>
+              <a:rPr lang="de-DE" dirty="0"/>
+              <a:t> </a:t>
+            </a:r>
+            <a:r>
+              <a:rPr lang="de-DE" dirty="0" err="1"/>
+              <a:t>software</a:t>
+            </a:r>
+            <a:r>
+              <a:rPr lang="de-DE" dirty="0"/>
+              <a:t>: </a:t>
+            </a:r>
+            <a:r>
+              <a:rPr lang="de-DE" dirty="0" err="1"/>
+              <a:t>libraries</a:t>
+            </a:r>
+            <a:r>
+              <a:rPr lang="de-DE" dirty="0"/>
+              <a:t> </a:t>
+            </a:r>
           </a:p>
         </p:txBody>
       </p:sp>
@@ -4367,15 +4412,7 @@
           <a:p>
             <a:r>
               <a:rPr lang="de-DE" dirty="0" smtClean="0"/>
-              <a:t>(</a:t>
-            </a:r>
-            <a:r>
-              <a:rPr lang="de-DE" dirty="0" err="1" smtClean="0"/>
-              <a:t>Azet</a:t>
-            </a:r>
-            <a:r>
-              <a:rPr lang="de-DE" dirty="0" smtClean="0"/>
-              <a:t>)</a:t>
+              <a:t>(cm, Adi)</a:t>
             </a:r>
             <a:endParaRPr lang="de-DE" dirty="0"/>
           </a:p>
@@ -4384,13 +4421,28 @@
     </p:spTree>
     <p:extLst>
       <p:ext uri="{BB962C8B-B14F-4D97-AF65-F5344CB8AC3E}">
-        <p14:creationId xmlns:p14="http://schemas.microsoft.com/office/powerpoint/2010/main" val="4179669894"/>
+        <p14:creationId xmlns:p14="http://schemas.microsoft.com/office/powerpoint/2010/main" val="1750082607"/>
       </p:ext>
     </p:extLst>
   </p:cSld>
   <p:clrMapOvr>
     <a:masterClrMapping/>
   </p:clrMapOvr>
+  <mc:AlternateContent xmlns:mc="http://schemas.openxmlformats.org/markup-compatibility/2006">
+    <mc:Choice xmlns:p14="http://schemas.microsoft.com/office/powerpoint/2010/main" Requires="p14">
+      <p:transition spd="slow" p14:dur="2000"/>
+    </mc:Choice>
+    <mc:Fallback>
+      <p:transition xmlns:p14="http://schemas.microsoft.com/office/powerpoint/2010/main" spd="slow"/>
+    </mc:Fallback>
+  </mc:AlternateContent>
+  <p:timing>
+    <p:tnLst>
+      <p:par>
+        <p:cTn xmlns:p14="http://schemas.microsoft.com/office/powerpoint/2010/main" id="1" dur="indefinite" restart="never" nodeType="tmRoot"/>
+      </p:par>
+    </p:tnLst>
+  </p:timing>
 </p:sld>
 </file>
 
@@ -4423,245 +4475,54 @@
         </p:nvSpPr>
         <p:spPr/>
         <p:txBody>
+          <a:bodyPr>
+            <a:normAutofit/>
+          </a:bodyPr>
+          <a:lstStyle/>
+          <a:p>
+            <a:r>
+              <a:rPr lang="de-DE" dirty="0" err="1"/>
+              <a:t>Attacks</a:t>
+            </a:r>
+            <a:r>
+              <a:rPr lang="de-DE" dirty="0"/>
+              <a:t>: BEAST, CRIME etc</a:t>
+            </a:r>
+            <a:r>
+              <a:rPr lang="de-DE" dirty="0" smtClean="0"/>
+              <a:t>.</a:t>
+            </a:r>
+            <a:endParaRPr lang="de-DE" dirty="0"/>
+          </a:p>
+        </p:txBody>
+      </p:sp>
+      <p:sp>
+        <p:nvSpPr>
+          <p:cNvPr id="3" name="Inhaltsplatzhalter 2"/>
+          <p:cNvSpPr>
+            <a:spLocks noGrp="1"/>
+          </p:cNvSpPr>
+          <p:nvPr>
+            <p:ph type="body" idx="1"/>
+          </p:nvPr>
+        </p:nvSpPr>
+        <p:spPr/>
+        <p:txBody>
           <a:bodyPr/>
           <a:lstStyle/>
           <a:p>
             <a:r>
-              <a:rPr lang="de-DE" dirty="0" err="1" smtClean="0"/>
-              <a:t>How</a:t>
-            </a:r>
-            <a:r>
-              <a:rPr lang="de-DE" dirty="0" smtClean="0"/>
-              <a:t> </a:t>
-            </a:r>
-            <a:r>
-              <a:rPr lang="de-DE" dirty="0" err="1" smtClean="0"/>
-              <a:t>to</a:t>
-            </a:r>
-            <a:r>
-              <a:rPr lang="de-DE" dirty="0" smtClean="0"/>
-              <a:t> </a:t>
-            </a:r>
-            <a:r>
-              <a:rPr lang="de-DE" dirty="0" err="1" smtClean="0"/>
-              <a:t>test</a:t>
-            </a:r>
-            <a:r>
-              <a:rPr lang="de-DE" dirty="0" smtClean="0"/>
-              <a:t>? - Tools</a:t>
-            </a:r>
-            <a:endParaRPr lang="de-DE" dirty="0"/>
-          </a:p>
-        </p:txBody>
-      </p:sp>
-      <p:sp>
-        <p:nvSpPr>
-          <p:cNvPr id="3" name="Inhaltsplatzhalter 2"/>
-          <p:cNvSpPr>
-            <a:spLocks noGrp="1"/>
-          </p:cNvSpPr>
-          <p:nvPr>
-            <p:ph idx="1"/>
-          </p:nvPr>
-        </p:nvSpPr>
-        <p:spPr/>
-        <p:txBody>
-          <a:bodyPr>
-            <a:normAutofit fontScale="92500" lnSpcReduction="10000"/>
-          </a:bodyPr>
-          <a:lstStyle/>
-          <a:p>
-            <a:r>
-              <a:rPr lang="de-DE" dirty="0" smtClean="0"/>
-              <a:t>(Pepi)</a:t>
-            </a:r>
-          </a:p>
-          <a:p>
-            <a:r>
-              <a:rPr lang="de-DE" dirty="0" err="1" smtClean="0"/>
-              <a:t>ssllabs.com</a:t>
-            </a:r>
-            <a:endParaRPr lang="de-DE" dirty="0" smtClean="0"/>
-          </a:p>
-          <a:p>
-            <a:r>
-              <a:rPr lang="de-DE" dirty="0" err="1" smtClean="0"/>
-              <a:t>xmpp.net</a:t>
-            </a:r>
-            <a:endParaRPr lang="de-DE" dirty="0" smtClean="0"/>
-          </a:p>
-          <a:p>
-            <a:r>
-              <a:rPr lang="de-DE" dirty="0" err="1" smtClean="0"/>
-              <a:t>Sslscan</a:t>
-            </a:r>
-            <a:r>
-              <a:rPr lang="de-DE" dirty="0" smtClean="0"/>
-              <a:t> (CLI </a:t>
-            </a:r>
-            <a:r>
-              <a:rPr lang="de-DE" dirty="0" err="1" smtClean="0"/>
-              <a:t>tool</a:t>
+              <a:rPr lang="de-DE" dirty="0" smtClean="0"/>
+              <a:t>(</a:t>
+            </a:r>
+            <a:r>
+              <a:rPr lang="de-DE" dirty="0" err="1" smtClean="0"/>
+              <a:t>Azet</a:t>
             </a:r>
             <a:r>
               <a:rPr lang="de-DE" dirty="0" smtClean="0"/>
               <a:t>)</a:t>
             </a:r>
-          </a:p>
-          <a:p>
-            <a:r>
-              <a:rPr lang="de-DE" dirty="0" err="1" smtClean="0"/>
-              <a:t>What</a:t>
-            </a:r>
-            <a:r>
-              <a:rPr lang="de-DE" dirty="0" smtClean="0"/>
-              <a:t> </a:t>
-            </a:r>
-            <a:r>
-              <a:rPr lang="de-DE" dirty="0" err="1" smtClean="0"/>
-              <a:t>can</a:t>
-            </a:r>
-            <a:r>
-              <a:rPr lang="de-DE" dirty="0" smtClean="0"/>
-              <a:t> </a:t>
-            </a:r>
-            <a:r>
-              <a:rPr lang="de-DE" dirty="0" err="1" smtClean="0"/>
-              <a:t>people</a:t>
-            </a:r>
-            <a:r>
-              <a:rPr lang="de-DE" dirty="0" smtClean="0"/>
-              <a:t> do </a:t>
-            </a:r>
-            <a:r>
-              <a:rPr lang="de-DE" dirty="0" err="1" smtClean="0"/>
-              <a:t>to</a:t>
-            </a:r>
-            <a:r>
-              <a:rPr lang="de-DE" dirty="0" smtClean="0"/>
-              <a:t> </a:t>
-            </a:r>
-            <a:r>
-              <a:rPr lang="de-DE" dirty="0" err="1" smtClean="0"/>
-              <a:t>test</a:t>
-            </a:r>
-            <a:r>
-              <a:rPr lang="de-DE" dirty="0" smtClean="0"/>
-              <a:t> </a:t>
-            </a:r>
-            <a:r>
-              <a:rPr lang="de-DE" dirty="0" err="1" smtClean="0"/>
-              <a:t>themselves</a:t>
-            </a:r>
-            <a:r>
-              <a:rPr lang="de-DE" dirty="0" smtClean="0"/>
-              <a:t>?</a:t>
-            </a:r>
-          </a:p>
-          <a:p>
-            <a:r>
-              <a:rPr lang="de-DE" dirty="0" err="1" smtClean="0"/>
-              <a:t>What</a:t>
-            </a:r>
-            <a:r>
-              <a:rPr lang="de-DE" dirty="0" smtClean="0"/>
-              <a:t> </a:t>
-            </a:r>
-            <a:r>
-              <a:rPr lang="de-DE" dirty="0" err="1" smtClean="0"/>
-              <a:t>does</a:t>
-            </a:r>
-            <a:r>
-              <a:rPr lang="de-DE" dirty="0"/>
-              <a:t> </a:t>
-            </a:r>
-            <a:r>
-              <a:rPr lang="de-DE" dirty="0" smtClean="0"/>
-              <a:t>a </a:t>
-            </a:r>
-            <a:r>
-              <a:rPr lang="de-DE" dirty="0" err="1" smtClean="0"/>
-              <a:t>test</a:t>
-            </a:r>
-            <a:r>
-              <a:rPr lang="de-DE" dirty="0" smtClean="0"/>
-              <a:t> </a:t>
-            </a:r>
-            <a:r>
-              <a:rPr lang="de-DE" dirty="0" err="1" smtClean="0"/>
-              <a:t>result</a:t>
-            </a:r>
-            <a:r>
-              <a:rPr lang="de-DE" dirty="0" smtClean="0"/>
-              <a:t> </a:t>
-            </a:r>
-            <a:r>
-              <a:rPr lang="de-DE" dirty="0" err="1" smtClean="0"/>
-              <a:t>mean</a:t>
-            </a:r>
-            <a:r>
-              <a:rPr lang="de-DE" dirty="0" smtClean="0"/>
-              <a:t>?</a:t>
-            </a:r>
-          </a:p>
-          <a:p>
-            <a:r>
-              <a:rPr lang="de-DE" dirty="0" smtClean="0"/>
-              <a:t>Potential </a:t>
-            </a:r>
-            <a:r>
-              <a:rPr lang="de-DE" dirty="0" err="1" smtClean="0"/>
-              <a:t>for</a:t>
-            </a:r>
-            <a:r>
-              <a:rPr lang="de-DE" dirty="0" smtClean="0"/>
-              <a:t> a </a:t>
-            </a:r>
-            <a:r>
-              <a:rPr lang="de-DE" dirty="0" err="1" smtClean="0"/>
-              <a:t>config</a:t>
-            </a:r>
-            <a:r>
-              <a:rPr lang="de-DE" dirty="0" smtClean="0"/>
-              <a:t> file </a:t>
-            </a:r>
-            <a:r>
-              <a:rPr lang="de-DE" dirty="0" err="1" smtClean="0"/>
-              <a:t>generator</a:t>
-            </a:r>
-            <a:r>
-              <a:rPr lang="de-DE" dirty="0" smtClean="0"/>
-              <a:t> (</a:t>
-            </a:r>
-            <a:r>
-              <a:rPr lang="de-DE" dirty="0" err="1" smtClean="0"/>
-              <a:t>as</a:t>
-            </a:r>
-            <a:r>
-              <a:rPr lang="de-DE" dirty="0" smtClean="0"/>
-              <a:t> </a:t>
-            </a:r>
-            <a:r>
-              <a:rPr lang="de-DE" dirty="0" err="1" smtClean="0"/>
-              <a:t>discussed</a:t>
-            </a:r>
-            <a:r>
-              <a:rPr lang="de-DE" dirty="0" smtClean="0"/>
-              <a:t>)?</a:t>
-            </a:r>
-          </a:p>
-          <a:p>
-            <a:r>
-              <a:rPr lang="de-DE" b="1" dirty="0" smtClean="0"/>
-              <a:t>Screenshots</a:t>
-            </a:r>
-            <a:r>
-              <a:rPr lang="de-DE" dirty="0" smtClean="0"/>
-              <a:t>!</a:t>
-            </a:r>
-            <a:endParaRPr lang="de-DE" dirty="0"/>
-          </a:p>
-          <a:p>
             <a:endParaRPr lang="de-DE" dirty="0"/>
           </a:p>
         </p:txBody>
@@ -4669,7 +4530,7 @@
     </p:spTree>
     <p:extLst>
       <p:ext uri="{BB962C8B-B14F-4D97-AF65-F5344CB8AC3E}">
-        <p14:creationId xmlns:p14="http://schemas.microsoft.com/office/powerpoint/2010/main" val="2778558749"/>
+        <p14:creationId xmlns:p14="http://schemas.microsoft.com/office/powerpoint/2010/main" val="4179669894"/>
       </p:ext>
     </p:extLst>
   </p:cSld>
@@ -4720,43 +4581,240 @@
           <a:p>
             <a:r>
               <a:rPr lang="de-DE" dirty="0" err="1" smtClean="0"/>
-              <a:t>Ssllabs.com</a:t>
-            </a:r>
-            <a:r>
-              <a:rPr lang="de-DE" dirty="0" smtClean="0"/>
-              <a:t> </a:t>
-            </a:r>
-            <a:r>
-              <a:rPr lang="de-DE" dirty="0" err="1" smtClean="0"/>
-              <a:t>Example</a:t>
+              <a:t>How</a:t>
+            </a:r>
+            <a:r>
+              <a:rPr lang="de-DE" dirty="0" smtClean="0"/>
+              <a:t> </a:t>
+            </a:r>
+            <a:r>
+              <a:rPr lang="de-DE" dirty="0" err="1" smtClean="0"/>
+              <a:t>to</a:t>
+            </a:r>
+            <a:r>
+              <a:rPr lang="de-DE" dirty="0" smtClean="0"/>
+              <a:t> </a:t>
+            </a:r>
+            <a:r>
+              <a:rPr lang="de-DE" dirty="0" err="1" smtClean="0"/>
+              <a:t>test</a:t>
+            </a:r>
+            <a:r>
+              <a:rPr lang="de-DE" dirty="0" smtClean="0"/>
+              <a:t>? - Tools</a:t>
             </a:r>
             <a:endParaRPr lang="de-DE" dirty="0"/>
           </a:p>
         </p:txBody>
       </p:sp>
-      <p:pic>
-        <p:nvPicPr>
-          <p:cNvPr id="4" name="Inhaltsplatzhalter 3"/>
-          <p:cNvPicPr>
-            <a:picLocks noGrp="1" noChangeAspect="1"/>
-          </p:cNvPicPr>
+      <p:sp>
+        <p:nvSpPr>
+          <p:cNvPr id="3" name="Inhaltsplatzhalter 2"/>
+          <p:cNvSpPr>
+            <a:spLocks noGrp="1"/>
+          </p:cNvSpPr>
           <p:nvPr>
             <p:ph idx="1"/>
           </p:nvPr>
-        </p:nvPicPr>
-        <p:blipFill>
-          <a:blip r:embed="rId2"/>
-          <a:srcRect l="-12668" r="-12668"/>
-          <a:stretch>
-            <a:fillRect/>
-          </a:stretch>
-        </p:blipFill>
-        <p:spPr/>
-      </p:pic>
+        </p:nvSpPr>
+        <p:spPr/>
+        <p:txBody>
+          <a:bodyPr>
+            <a:normAutofit lnSpcReduction="10000"/>
+          </a:bodyPr>
+          <a:lstStyle/>
+          <a:p>
+            <a:r>
+              <a:rPr lang="de-DE" dirty="0" smtClean="0"/>
+              <a:t>(Pepi)</a:t>
+            </a:r>
+          </a:p>
+          <a:p>
+            <a:r>
+              <a:rPr lang="de-DE" dirty="0" err="1" smtClean="0"/>
+              <a:t>ssllabs.com</a:t>
+            </a:r>
+            <a:endParaRPr lang="de-DE" dirty="0" smtClean="0"/>
+          </a:p>
+          <a:p>
+            <a:r>
+              <a:rPr lang="de-DE" dirty="0" err="1" smtClean="0"/>
+              <a:t>xmpp.net</a:t>
+            </a:r>
+            <a:endParaRPr lang="de-DE" dirty="0" smtClean="0"/>
+          </a:p>
+          <a:p>
+            <a:r>
+              <a:rPr lang="de-DE" dirty="0" err="1" smtClean="0"/>
+              <a:t>Sslscan</a:t>
+            </a:r>
+            <a:r>
+              <a:rPr lang="de-DE" dirty="0" smtClean="0"/>
+              <a:t> (CLI </a:t>
+            </a:r>
+            <a:r>
+              <a:rPr lang="de-DE" dirty="0" err="1" smtClean="0"/>
+              <a:t>tool</a:t>
+            </a:r>
+            <a:r>
+              <a:rPr lang="de-DE" dirty="0" smtClean="0"/>
+              <a:t>)</a:t>
+            </a:r>
+          </a:p>
+          <a:p>
+            <a:r>
+              <a:rPr lang="de-DE" dirty="0" err="1" smtClean="0"/>
+              <a:t>What</a:t>
+            </a:r>
+            <a:r>
+              <a:rPr lang="de-DE" dirty="0" smtClean="0"/>
+              <a:t> </a:t>
+            </a:r>
+            <a:r>
+              <a:rPr lang="de-DE" dirty="0" err="1" smtClean="0"/>
+              <a:t>can</a:t>
+            </a:r>
+            <a:r>
+              <a:rPr lang="de-DE" dirty="0" smtClean="0"/>
+              <a:t> </a:t>
+            </a:r>
+            <a:r>
+              <a:rPr lang="de-DE" dirty="0" err="1" smtClean="0"/>
+              <a:t>people</a:t>
+            </a:r>
+            <a:r>
+              <a:rPr lang="de-DE" dirty="0" smtClean="0"/>
+              <a:t> do </a:t>
+            </a:r>
+            <a:r>
+              <a:rPr lang="de-DE" dirty="0" err="1" smtClean="0"/>
+              <a:t>to</a:t>
+            </a:r>
+            <a:r>
+              <a:rPr lang="de-DE" dirty="0" smtClean="0"/>
+              <a:t> </a:t>
+            </a:r>
+            <a:r>
+              <a:rPr lang="de-DE" dirty="0" err="1" smtClean="0"/>
+              <a:t>test</a:t>
+            </a:r>
+            <a:r>
+              <a:rPr lang="de-DE" dirty="0" smtClean="0"/>
+              <a:t> </a:t>
+            </a:r>
+            <a:r>
+              <a:rPr lang="de-DE" dirty="0" err="1" smtClean="0"/>
+              <a:t>themselves</a:t>
+            </a:r>
+            <a:r>
+              <a:rPr lang="de-DE" dirty="0" smtClean="0"/>
+              <a:t>?</a:t>
+            </a:r>
+          </a:p>
+          <a:p>
+            <a:r>
+              <a:rPr lang="de-DE" dirty="0" err="1" smtClean="0"/>
+              <a:t>What</a:t>
+            </a:r>
+            <a:r>
+              <a:rPr lang="de-DE" dirty="0" smtClean="0"/>
+              <a:t> </a:t>
+            </a:r>
+            <a:r>
+              <a:rPr lang="de-DE" dirty="0" err="1" smtClean="0"/>
+              <a:t>does</a:t>
+            </a:r>
+            <a:r>
+              <a:rPr lang="de-DE" dirty="0"/>
+              <a:t> </a:t>
+            </a:r>
+            <a:r>
+              <a:rPr lang="de-DE" dirty="0" smtClean="0"/>
+              <a:t>a </a:t>
+            </a:r>
+            <a:r>
+              <a:rPr lang="de-DE" dirty="0" err="1" smtClean="0"/>
+              <a:t>test</a:t>
+            </a:r>
+            <a:r>
+              <a:rPr lang="de-DE" dirty="0" smtClean="0"/>
+              <a:t> </a:t>
+            </a:r>
+            <a:r>
+              <a:rPr lang="de-DE" dirty="0" err="1" smtClean="0"/>
+              <a:t>result</a:t>
+            </a:r>
+            <a:r>
+              <a:rPr lang="de-DE" dirty="0" smtClean="0"/>
+              <a:t> </a:t>
+            </a:r>
+            <a:r>
+              <a:rPr lang="de-DE" dirty="0" err="1" smtClean="0"/>
+              <a:t>mean</a:t>
+            </a:r>
+            <a:r>
+              <a:rPr lang="de-DE" dirty="0" smtClean="0"/>
+              <a:t>?</a:t>
+            </a:r>
+          </a:p>
+          <a:p>
+            <a:r>
+              <a:rPr lang="de-DE" dirty="0" smtClean="0"/>
+              <a:t>Potential </a:t>
+            </a:r>
+            <a:r>
+              <a:rPr lang="de-DE" dirty="0" err="1" smtClean="0"/>
+              <a:t>for</a:t>
+            </a:r>
+            <a:r>
+              <a:rPr lang="de-DE" dirty="0" smtClean="0"/>
+              <a:t> a </a:t>
+            </a:r>
+            <a:r>
+              <a:rPr lang="de-DE" dirty="0" err="1" smtClean="0"/>
+              <a:t>config</a:t>
+            </a:r>
+            <a:r>
+              <a:rPr lang="de-DE" dirty="0" smtClean="0"/>
+              <a:t> file </a:t>
+            </a:r>
+            <a:r>
+              <a:rPr lang="de-DE" dirty="0" err="1" smtClean="0"/>
+              <a:t>generator</a:t>
+            </a:r>
+            <a:r>
+              <a:rPr lang="de-DE" dirty="0" smtClean="0"/>
+              <a:t> (</a:t>
+            </a:r>
+            <a:r>
+              <a:rPr lang="de-DE" dirty="0" err="1" smtClean="0"/>
+              <a:t>as</a:t>
+            </a:r>
+            <a:r>
+              <a:rPr lang="de-DE" dirty="0" smtClean="0"/>
+              <a:t> </a:t>
+            </a:r>
+            <a:r>
+              <a:rPr lang="de-DE" dirty="0" err="1" smtClean="0"/>
+              <a:t>discussed</a:t>
+            </a:r>
+            <a:r>
+              <a:rPr lang="de-DE" dirty="0" smtClean="0"/>
+              <a:t>)?</a:t>
+            </a:r>
+          </a:p>
+          <a:p>
+            <a:pPr marL="0" indent="0">
+              <a:buNone/>
+            </a:pPr>
+            <a:endParaRPr lang="de-DE" dirty="0"/>
+          </a:p>
+        </p:txBody>
+      </p:sp>
     </p:spTree>
     <p:extLst>
       <p:ext uri="{BB962C8B-B14F-4D97-AF65-F5344CB8AC3E}">
-        <p14:creationId xmlns:p14="http://schemas.microsoft.com/office/powerpoint/2010/main" val="2765823629"/>
+        <p14:creationId xmlns:p14="http://schemas.microsoft.com/office/powerpoint/2010/main" val="2778558749"/>
       </p:ext>
     </p:extLst>
   </p:cSld>
@@ -4802,246 +4860,48 @@
         </p:nvSpPr>
         <p:spPr/>
         <p:txBody>
-          <a:bodyPr>
-            <a:normAutofit fontScale="90000"/>
-          </a:bodyPr>
-          <a:lstStyle/>
-          <a:p>
-            <a:r>
-              <a:rPr lang="de-DE" dirty="0" err="1">
-                <a:solidFill>
-                  <a:srgbClr val="008000"/>
-                </a:solidFill>
-              </a:rPr>
-              <a:t>Recommendations</a:t>
-            </a:r>
-            <a:r>
-              <a:rPr lang="de-DE" dirty="0">
-                <a:solidFill>
-                  <a:srgbClr val="008000"/>
-                </a:solidFill>
-              </a:rPr>
-              <a:t> on </a:t>
-            </a:r>
-            <a:r>
-              <a:rPr lang="de-DE" dirty="0" err="1">
-                <a:solidFill>
-                  <a:srgbClr val="008000"/>
-                </a:solidFill>
-              </a:rPr>
-              <a:t>practical</a:t>
-            </a:r>
-            <a:r>
-              <a:rPr lang="de-DE" dirty="0">
-                <a:solidFill>
-                  <a:srgbClr val="008000"/>
-                </a:solidFill>
-              </a:rPr>
-              <a:t> </a:t>
-            </a:r>
-            <a:r>
-              <a:rPr lang="de-DE" dirty="0" err="1">
-                <a:solidFill>
-                  <a:srgbClr val="008000"/>
-                </a:solidFill>
-              </a:rPr>
-              <a:t>settings</a:t>
-            </a:r>
-            <a:r>
-              <a:rPr lang="de-DE" dirty="0">
-                <a:solidFill>
-                  <a:srgbClr val="008000"/>
-                </a:solidFill>
-              </a:rPr>
-              <a:t> </a:t>
-            </a:r>
-            <a:r>
-              <a:rPr lang="de-DE" dirty="0" smtClean="0">
-                <a:solidFill>
-                  <a:srgbClr val="008000"/>
-                </a:solidFill>
-              </a:rPr>
-              <a:t>– </a:t>
-            </a:r>
-            <a:r>
-              <a:rPr lang="de-DE" dirty="0" err="1" smtClean="0">
-                <a:solidFill>
-                  <a:srgbClr val="008000"/>
-                </a:solidFill>
-              </a:rPr>
-              <a:t>our</a:t>
-            </a:r>
-            <a:r>
-              <a:rPr lang="de-DE" dirty="0" smtClean="0">
-                <a:solidFill>
-                  <a:srgbClr val="008000"/>
-                </a:solidFill>
-              </a:rPr>
-              <a:t> </a:t>
-            </a:r>
-            <a:r>
-              <a:rPr lang="de-DE" dirty="0" err="1" smtClean="0">
-                <a:solidFill>
-                  <a:srgbClr val="008000"/>
-                </a:solidFill>
-              </a:rPr>
-              <a:t>findings</a:t>
-            </a:r>
-            <a:r>
-              <a:rPr lang="de-DE" dirty="0" smtClean="0">
-                <a:solidFill>
-                  <a:srgbClr val="008000"/>
-                </a:solidFill>
-              </a:rPr>
-              <a:t> so </a:t>
-            </a:r>
-            <a:r>
-              <a:rPr lang="de-DE" dirty="0" err="1" smtClean="0">
-                <a:solidFill>
-                  <a:srgbClr val="008000"/>
-                </a:solidFill>
-              </a:rPr>
-              <a:t>far</a:t>
+          <a:bodyPr/>
+          <a:lstStyle/>
+          <a:p>
+            <a:r>
+              <a:rPr lang="de-DE" dirty="0" err="1" smtClean="0"/>
+              <a:t>Ssllabs.com</a:t>
+            </a:r>
+            <a:r>
+              <a:rPr lang="de-DE" dirty="0" smtClean="0"/>
+              <a:t> </a:t>
+            </a:r>
+            <a:r>
+              <a:rPr lang="de-DE" dirty="0" err="1" smtClean="0"/>
+              <a:t>Example</a:t>
             </a:r>
             <a:endParaRPr lang="de-DE" dirty="0"/>
           </a:p>
         </p:txBody>
       </p:sp>
-      <p:sp>
-        <p:nvSpPr>
-          <p:cNvPr id="3" name="Inhaltsplatzhalter 2"/>
-          <p:cNvSpPr>
-            <a:spLocks noGrp="1"/>
-          </p:cNvSpPr>
+      <p:pic>
+        <p:nvPicPr>
+          <p:cNvPr id="4" name="Inhaltsplatzhalter 3"/>
+          <p:cNvPicPr>
+            <a:picLocks noGrp="1" noChangeAspect="1"/>
+          </p:cNvPicPr>
           <p:nvPr>
             <p:ph idx="1"/>
           </p:nvPr>
-        </p:nvSpPr>
-        <p:spPr/>
-        <p:txBody>
-          <a:bodyPr/>
-          <a:lstStyle/>
-          <a:p>
-            <a:r>
-              <a:rPr lang="de-DE" dirty="0"/>
-              <a:t>Apache </a:t>
-            </a:r>
-            <a:r>
-              <a:rPr lang="de-DE" dirty="0" smtClean="0"/>
-              <a:t>(Adi, </a:t>
-            </a:r>
-            <a:r>
-              <a:rPr lang="de-DE" dirty="0" err="1" smtClean="0"/>
-              <a:t>Azet</a:t>
-            </a:r>
-            <a:r>
-              <a:rPr lang="de-DE" dirty="0" smtClean="0"/>
-              <a:t>)</a:t>
-            </a:r>
-            <a:endParaRPr lang="de-DE" dirty="0"/>
-          </a:p>
-          <a:p>
-            <a:r>
-              <a:rPr lang="de-DE" dirty="0" err="1" smtClean="0"/>
-              <a:t>Nginx</a:t>
-            </a:r>
-            <a:r>
-              <a:rPr lang="de-DE" dirty="0" smtClean="0"/>
-              <a:t> (Adi, Pepi)</a:t>
-            </a:r>
-          </a:p>
-          <a:p>
-            <a:r>
-              <a:rPr lang="de-DE" dirty="0" smtClean="0"/>
-              <a:t>MS IIS (Ramin)</a:t>
-            </a:r>
-          </a:p>
-          <a:p>
-            <a:r>
-              <a:rPr lang="de-DE" dirty="0" err="1" smtClean="0"/>
-              <a:t>Postfix</a:t>
-            </a:r>
-            <a:r>
-              <a:rPr lang="de-DE" dirty="0" smtClean="0"/>
-              <a:t> , </a:t>
-            </a:r>
-            <a:r>
-              <a:rPr lang="de-DE" dirty="0" err="1" smtClean="0"/>
-              <a:t>dovecot</a:t>
-            </a:r>
-            <a:r>
-              <a:rPr lang="de-DE" dirty="0"/>
-              <a:t> </a:t>
-            </a:r>
-            <a:r>
-              <a:rPr lang="de-DE" dirty="0" smtClean="0"/>
-              <a:t>(cm)</a:t>
-            </a:r>
-          </a:p>
-          <a:p>
-            <a:r>
-              <a:rPr lang="de-DE" dirty="0" err="1" smtClean="0"/>
-              <a:t>Opportunistic</a:t>
-            </a:r>
-            <a:r>
-              <a:rPr lang="de-DE" dirty="0" smtClean="0"/>
-              <a:t> TLS, </a:t>
-            </a:r>
-            <a:r>
-              <a:rPr lang="de-DE" dirty="0" err="1" smtClean="0"/>
-              <a:t>what</a:t>
-            </a:r>
-            <a:r>
-              <a:rPr lang="de-DE" dirty="0" smtClean="0"/>
-              <a:t> </a:t>
-            </a:r>
-            <a:r>
-              <a:rPr lang="de-DE" dirty="0" err="1" smtClean="0"/>
-              <a:t>is</a:t>
-            </a:r>
-            <a:r>
-              <a:rPr lang="de-DE" dirty="0" smtClean="0"/>
-              <a:t> </a:t>
-            </a:r>
-            <a:r>
-              <a:rPr lang="de-DE" dirty="0" err="1" smtClean="0"/>
-              <a:t>that</a:t>
-            </a:r>
-            <a:r>
-              <a:rPr lang="de-DE" dirty="0" smtClean="0"/>
-              <a:t>? (cm)</a:t>
-            </a:r>
-          </a:p>
-          <a:p>
-            <a:r>
-              <a:rPr lang="de-DE" dirty="0"/>
-              <a:t>s</a:t>
-            </a:r>
-            <a:r>
-              <a:rPr lang="de-DE" dirty="0" smtClean="0"/>
-              <a:t>sh (</a:t>
-            </a:r>
-            <a:r>
-              <a:rPr lang="de-DE" dirty="0" err="1" smtClean="0"/>
-              <a:t>Azet</a:t>
-            </a:r>
-            <a:r>
-              <a:rPr lang="de-DE" dirty="0" smtClean="0"/>
-              <a:t>)</a:t>
-            </a:r>
-          </a:p>
-          <a:p>
-            <a:endParaRPr lang="de-DE" dirty="0" smtClean="0"/>
-          </a:p>
-          <a:p>
-            <a:endParaRPr lang="de-DE" dirty="0"/>
-          </a:p>
-        </p:txBody>
-      </p:sp>
+        </p:nvPicPr>
+        <p:blipFill>
+          <a:blip r:embed="rId2"/>
+          <a:srcRect l="-12668" r="-12668"/>
+          <a:stretch>
+            <a:fillRect/>
+          </a:stretch>
+        </p:blipFill>
+        <p:spPr/>
+      </p:pic>
     </p:spTree>
     <p:extLst>
       <p:ext uri="{BB962C8B-B14F-4D97-AF65-F5344CB8AC3E}">
-        <p14:creationId xmlns:p14="http://schemas.microsoft.com/office/powerpoint/2010/main" val="1947993787"/>
+        <p14:creationId xmlns:p14="http://schemas.microsoft.com/office/powerpoint/2010/main" val="2765823629"/>
       </p:ext>
     </p:extLst>
   </p:cSld>
@@ -5166,253 +5026,236 @@
         </p:nvSpPr>
         <p:spPr/>
         <p:txBody>
+          <a:bodyPr>
+            <a:normAutofit fontScale="90000"/>
+          </a:bodyPr>
+          <a:lstStyle/>
+          <a:p>
+            <a:r>
+              <a:rPr lang="de-DE" dirty="0" err="1">
+                <a:solidFill>
+                  <a:srgbClr val="008000"/>
+                </a:solidFill>
+              </a:rPr>
+              <a:t>Recommendations</a:t>
+            </a:r>
+            <a:r>
+              <a:rPr lang="de-DE" dirty="0">
+                <a:solidFill>
+                  <a:srgbClr val="008000"/>
+                </a:solidFill>
+              </a:rPr>
+              <a:t> on </a:t>
+            </a:r>
+            <a:r>
+              <a:rPr lang="de-DE" dirty="0" err="1">
+                <a:solidFill>
+                  <a:srgbClr val="008000"/>
+                </a:solidFill>
+              </a:rPr>
+              <a:t>practical</a:t>
+            </a:r>
+            <a:r>
+              <a:rPr lang="de-DE" dirty="0">
+                <a:solidFill>
+                  <a:srgbClr val="008000"/>
+                </a:solidFill>
+              </a:rPr>
+              <a:t> </a:t>
+            </a:r>
+            <a:r>
+              <a:rPr lang="de-DE" dirty="0" err="1">
+                <a:solidFill>
+                  <a:srgbClr val="008000"/>
+                </a:solidFill>
+              </a:rPr>
+              <a:t>settings</a:t>
+            </a:r>
+            <a:r>
+              <a:rPr lang="de-DE" dirty="0">
+                <a:solidFill>
+                  <a:srgbClr val="008000"/>
+                </a:solidFill>
+              </a:rPr>
+              <a:t> </a:t>
+            </a:r>
+            <a:r>
+              <a:rPr lang="de-DE" dirty="0" smtClean="0">
+                <a:solidFill>
+                  <a:srgbClr val="008000"/>
+                </a:solidFill>
+              </a:rPr>
+              <a:t>– </a:t>
+            </a:r>
+            <a:r>
+              <a:rPr lang="de-DE" dirty="0" err="1" smtClean="0">
+                <a:solidFill>
+                  <a:srgbClr val="008000"/>
+                </a:solidFill>
+              </a:rPr>
+              <a:t>our</a:t>
+            </a:r>
+            <a:r>
+              <a:rPr lang="de-DE" dirty="0" smtClean="0">
+                <a:solidFill>
+                  <a:srgbClr val="008000"/>
+                </a:solidFill>
+              </a:rPr>
+              <a:t> </a:t>
+            </a:r>
+            <a:r>
+              <a:rPr lang="de-DE" dirty="0" err="1" smtClean="0">
+                <a:solidFill>
+                  <a:srgbClr val="008000"/>
+                </a:solidFill>
+              </a:rPr>
+              <a:t>findings</a:t>
+            </a:r>
+            <a:r>
+              <a:rPr lang="de-DE" dirty="0" smtClean="0">
+                <a:solidFill>
+                  <a:srgbClr val="008000"/>
+                </a:solidFill>
+              </a:rPr>
+              <a:t> so </a:t>
+            </a:r>
+            <a:r>
+              <a:rPr lang="de-DE" dirty="0" err="1" smtClean="0">
+                <a:solidFill>
+                  <a:srgbClr val="008000"/>
+                </a:solidFill>
+              </a:rPr>
+              <a:t>far</a:t>
+            </a:r>
+            <a:endParaRPr lang="de-DE" dirty="0"/>
+          </a:p>
+        </p:txBody>
+      </p:sp>
+      <p:sp>
+        <p:nvSpPr>
+          <p:cNvPr id="3" name="Inhaltsplatzhalter 2"/>
+          <p:cNvSpPr>
+            <a:spLocks noGrp="1"/>
+          </p:cNvSpPr>
+          <p:nvPr>
+            <p:ph idx="1"/>
+          </p:nvPr>
+        </p:nvSpPr>
+        <p:spPr/>
+        <p:txBody>
           <a:bodyPr/>
           <a:lstStyle/>
           <a:p>
             <a:r>
-              <a:rPr lang="de-DE" dirty="0" err="1" smtClean="0"/>
-              <a:t>Current</a:t>
-            </a:r>
-            <a:r>
-              <a:rPr lang="de-DE" dirty="0" smtClean="0"/>
-              <a:t> </a:t>
-            </a:r>
-            <a:r>
-              <a:rPr lang="de-DE" dirty="0" err="1" smtClean="0"/>
-              <a:t>state</a:t>
-            </a:r>
-            <a:r>
-              <a:rPr lang="de-DE" dirty="0" smtClean="0"/>
-              <a:t> </a:t>
-            </a:r>
-            <a:r>
-              <a:rPr lang="de-DE" dirty="0" err="1" smtClean="0"/>
-              <a:t>as</a:t>
-            </a:r>
-            <a:r>
-              <a:rPr lang="de-DE" dirty="0" smtClean="0"/>
-              <a:t> of 2013/11</a:t>
-            </a:r>
-            <a:r>
-              <a:rPr lang="de-DE" dirty="0" smtClean="0"/>
-              <a:t>/13</a:t>
+              <a:rPr lang="de-DE" dirty="0"/>
+              <a:t>Apache </a:t>
+            </a:r>
+            <a:r>
+              <a:rPr lang="de-DE" dirty="0" smtClean="0"/>
+              <a:t>(Adi, </a:t>
+            </a:r>
+            <a:r>
+              <a:rPr lang="de-DE" dirty="0" err="1" smtClean="0"/>
+              <a:t>Azet</a:t>
+            </a:r>
+            <a:r>
+              <a:rPr lang="de-DE" dirty="0" smtClean="0"/>
+              <a:t>)</a:t>
             </a:r>
             <a:endParaRPr lang="de-DE" dirty="0"/>
           </a:p>
-        </p:txBody>
-      </p:sp>
-      <p:sp>
-        <p:nvSpPr>
-          <p:cNvPr id="3" name="Inhaltsplatzhalter 2"/>
-          <p:cNvSpPr>
-            <a:spLocks noGrp="1"/>
-          </p:cNvSpPr>
-          <p:nvPr>
-            <p:ph idx="1"/>
-          </p:nvPr>
-        </p:nvSpPr>
-        <p:spPr/>
-        <p:txBody>
-          <a:bodyPr/>
-          <a:lstStyle/>
-          <a:p>
-            <a:r>
-              <a:rPr lang="de-DE" dirty="0" smtClean="0"/>
-              <a:t>Initial </a:t>
-            </a:r>
-            <a:r>
-              <a:rPr lang="de-DE" dirty="0" err="1" smtClean="0"/>
-              <a:t>ongoing</a:t>
-            </a:r>
-            <a:r>
-              <a:rPr lang="de-DE" dirty="0" smtClean="0"/>
-              <a:t> </a:t>
-            </a:r>
-            <a:r>
-              <a:rPr lang="de-DE" dirty="0" err="1" smtClean="0"/>
-              <a:t>work</a:t>
-            </a:r>
-            <a:r>
-              <a:rPr lang="de-DE" dirty="0" smtClean="0"/>
-              <a:t> in </a:t>
-            </a:r>
-            <a:r>
-              <a:rPr lang="de-DE" dirty="0" err="1" smtClean="0"/>
-              <a:t>the</a:t>
-            </a:r>
-            <a:r>
-              <a:rPr lang="de-DE" dirty="0" smtClean="0"/>
-              <a:t> </a:t>
-            </a:r>
-            <a:r>
-              <a:rPr lang="de-DE" dirty="0" err="1" smtClean="0"/>
-              <a:t>git</a:t>
-            </a:r>
-            <a:r>
-              <a:rPr lang="de-DE" dirty="0" smtClean="0"/>
-              <a:t> </a:t>
-            </a:r>
-            <a:r>
-              <a:rPr lang="de-DE" dirty="0" err="1" smtClean="0"/>
-              <a:t>repository</a:t>
-            </a:r>
+          <a:p>
+            <a:r>
+              <a:rPr lang="de-DE" dirty="0" err="1" smtClean="0"/>
+              <a:t>Nginx</a:t>
+            </a:r>
+            <a:r>
+              <a:rPr lang="de-DE" dirty="0" smtClean="0"/>
+              <a:t> (Adi, Pepi)</a:t>
+            </a:r>
+          </a:p>
+          <a:p>
+            <a:r>
+              <a:rPr lang="de-DE" dirty="0" smtClean="0"/>
+              <a:t>MS IIS (Ramin)</a:t>
+            </a:r>
+          </a:p>
+          <a:p>
+            <a:r>
+              <a:rPr lang="de-DE" dirty="0" err="1" smtClean="0"/>
+              <a:t>Postfix</a:t>
+            </a:r>
+            <a:r>
+              <a:rPr lang="de-DE" dirty="0" smtClean="0"/>
+              <a:t> , </a:t>
+            </a:r>
+            <a:r>
+              <a:rPr lang="de-DE" dirty="0" err="1" smtClean="0"/>
+              <a:t>dovecot</a:t>
+            </a:r>
+            <a:r>
+              <a:rPr lang="de-DE" dirty="0"/>
+              <a:t> </a:t>
+            </a:r>
+            <a:r>
+              <a:rPr lang="de-DE" dirty="0" smtClean="0"/>
+              <a:t>(cm)</a:t>
+            </a:r>
+          </a:p>
+          <a:p>
+            <a:r>
+              <a:rPr lang="de-DE" dirty="0" err="1" smtClean="0"/>
+              <a:t>Opportunistic</a:t>
+            </a:r>
+            <a:r>
+              <a:rPr lang="de-DE" dirty="0" smtClean="0"/>
+              <a:t> TLS, </a:t>
+            </a:r>
+            <a:r>
+              <a:rPr lang="de-DE" dirty="0" err="1" smtClean="0"/>
+              <a:t>what</a:t>
+            </a:r>
+            <a:r>
+              <a:rPr lang="de-DE" dirty="0" smtClean="0"/>
+              <a:t> </a:t>
+            </a:r>
+            <a:r>
+              <a:rPr lang="de-DE" dirty="0" err="1" smtClean="0"/>
+              <a:t>is</a:t>
+            </a:r>
+            <a:r>
+              <a:rPr lang="de-DE" dirty="0" smtClean="0"/>
+              <a:t> </a:t>
+            </a:r>
+            <a:r>
+              <a:rPr lang="de-DE" dirty="0" err="1" smtClean="0"/>
+              <a:t>that</a:t>
+            </a:r>
+            <a:r>
+              <a:rPr lang="de-DE" dirty="0" smtClean="0"/>
+              <a:t>? (cm)</a:t>
+            </a:r>
+          </a:p>
+          <a:p>
+            <a:r>
+              <a:rPr lang="de-DE" dirty="0"/>
+              <a:t>s</a:t>
+            </a:r>
+            <a:r>
+              <a:rPr lang="de-DE" dirty="0" smtClean="0"/>
+              <a:t>sh (</a:t>
+            </a:r>
+            <a:r>
+              <a:rPr lang="de-DE" dirty="0" err="1" smtClean="0"/>
+              <a:t>Azet</a:t>
+            </a:r>
+            <a:r>
+              <a:rPr lang="de-DE" dirty="0" smtClean="0"/>
+              <a:t>)</a:t>
+            </a:r>
+          </a:p>
+          <a:p>
             <a:endParaRPr lang="de-DE" dirty="0" smtClean="0"/>
-          </a:p>
-          <a:p>
-            <a:r>
-              <a:rPr lang="de-DE" dirty="0" smtClean="0"/>
-              <a:t>More </a:t>
-            </a:r>
-            <a:r>
-              <a:rPr lang="de-DE" dirty="0" err="1" smtClean="0"/>
-              <a:t>testing</a:t>
-            </a:r>
-            <a:r>
-              <a:rPr lang="de-DE" dirty="0" smtClean="0"/>
-              <a:t> </a:t>
-            </a:r>
-            <a:r>
-              <a:rPr lang="de-DE" dirty="0" err="1" smtClean="0"/>
-              <a:t>needed</a:t>
-            </a:r>
-            <a:r>
-              <a:rPr lang="de-DE" dirty="0" smtClean="0"/>
-              <a:t>. </a:t>
-            </a:r>
-            <a:r>
-              <a:rPr lang="de-DE" dirty="0" err="1" smtClean="0"/>
-              <a:t>Especially</a:t>
-            </a:r>
-            <a:r>
-              <a:rPr lang="de-DE" dirty="0" smtClean="0"/>
-              <a:t> </a:t>
-            </a:r>
-            <a:r>
-              <a:rPr lang="de-DE" dirty="0" err="1" smtClean="0"/>
-              <a:t>compatibility</a:t>
-            </a:r>
-            <a:r>
-              <a:rPr lang="de-DE" dirty="0" smtClean="0"/>
-              <a:t> </a:t>
-            </a:r>
-            <a:r>
-              <a:rPr lang="de-DE" dirty="0" err="1" smtClean="0"/>
-              <a:t>with</a:t>
-            </a:r>
-            <a:r>
-              <a:rPr lang="de-DE" dirty="0" smtClean="0"/>
-              <a:t> </a:t>
-            </a:r>
-            <a:r>
-              <a:rPr lang="de-DE" dirty="0" err="1" smtClean="0"/>
-              <a:t>clients</a:t>
-            </a:r>
-            <a:r>
-              <a:rPr lang="de-DE" dirty="0" smtClean="0"/>
-              <a:t> </a:t>
-            </a:r>
-            <a:r>
-              <a:rPr lang="de-DE" dirty="0" err="1" smtClean="0"/>
-              <a:t>and</a:t>
-            </a:r>
-            <a:r>
-              <a:rPr lang="de-DE" dirty="0" smtClean="0"/>
-              <a:t> </a:t>
-            </a:r>
-            <a:r>
-              <a:rPr lang="de-DE" dirty="0" err="1" smtClean="0"/>
-              <a:t>when</a:t>
-            </a:r>
-            <a:r>
-              <a:rPr lang="de-DE" dirty="0" smtClean="0"/>
-              <a:t> </a:t>
-            </a:r>
-            <a:r>
-              <a:rPr lang="de-DE" dirty="0" err="1" smtClean="0"/>
-              <a:t>to</a:t>
-            </a:r>
-            <a:r>
-              <a:rPr lang="de-DE" dirty="0" smtClean="0"/>
-              <a:t> </a:t>
-            </a:r>
-            <a:r>
-              <a:rPr lang="de-DE" dirty="0" err="1" smtClean="0"/>
-              <a:t>simply</a:t>
-            </a:r>
-            <a:r>
-              <a:rPr lang="de-DE" dirty="0" smtClean="0"/>
-              <a:t> </a:t>
-            </a:r>
-            <a:r>
-              <a:rPr lang="de-DE" dirty="0" err="1" smtClean="0"/>
-              <a:t>ignore</a:t>
-            </a:r>
-            <a:r>
-              <a:rPr lang="de-DE" dirty="0" smtClean="0"/>
-              <a:t> </a:t>
-            </a:r>
-            <a:r>
-              <a:rPr lang="de-DE" dirty="0" err="1" smtClean="0"/>
-              <a:t>old</a:t>
-            </a:r>
-            <a:r>
-              <a:rPr lang="de-DE" dirty="0" smtClean="0"/>
-              <a:t> </a:t>
-            </a:r>
-            <a:r>
-              <a:rPr lang="de-DE" dirty="0" err="1" smtClean="0"/>
-              <a:t>clients</a:t>
-            </a:r>
-            <a:r>
-              <a:rPr lang="de-DE" dirty="0" smtClean="0"/>
-              <a:t> (RC4,...)</a:t>
-            </a:r>
-          </a:p>
-          <a:p>
-            <a:r>
-              <a:rPr lang="de-DE" dirty="0" smtClean="0"/>
-              <a:t> Need </a:t>
-            </a:r>
-            <a:r>
-              <a:rPr lang="de-DE" dirty="0" err="1" smtClean="0"/>
-              <a:t>to</a:t>
-            </a:r>
-            <a:r>
-              <a:rPr lang="de-DE" dirty="0" smtClean="0"/>
-              <a:t> </a:t>
-            </a:r>
-            <a:r>
-              <a:rPr lang="de-DE" dirty="0" err="1" smtClean="0"/>
-              <a:t>fill</a:t>
-            </a:r>
-            <a:r>
-              <a:rPr lang="de-DE" dirty="0" smtClean="0"/>
-              <a:t> in </a:t>
-            </a:r>
-            <a:r>
-              <a:rPr lang="de-DE" dirty="0" err="1" smtClean="0"/>
-              <a:t>other</a:t>
-            </a:r>
-            <a:r>
-              <a:rPr lang="de-DE" dirty="0" smtClean="0"/>
-              <a:t> </a:t>
-            </a:r>
-            <a:r>
-              <a:rPr lang="de-DE" dirty="0" err="1" smtClean="0"/>
-              <a:t>sections</a:t>
-            </a:r>
-            <a:r>
-              <a:rPr lang="de-DE" dirty="0" smtClean="0"/>
-              <a:t> </a:t>
-            </a:r>
-            <a:r>
-              <a:rPr lang="de-DE" dirty="0" smtClean="0"/>
-              <a:t>(PGP, Exchange server, .</a:t>
-            </a:r>
-            <a:r>
-              <a:rPr lang="de-DE" dirty="0" smtClean="0"/>
-              <a:t>..)</a:t>
-            </a:r>
           </a:p>
           <a:p>
             <a:endParaRPr lang="de-DE" dirty="0"/>
@@ -5422,7 +5265,7 @@
     </p:spTree>
     <p:extLst>
       <p:ext uri="{BB962C8B-B14F-4D97-AF65-F5344CB8AC3E}">
-        <p14:creationId xmlns:p14="http://schemas.microsoft.com/office/powerpoint/2010/main" val="51044277"/>
+        <p14:creationId xmlns:p14="http://schemas.microsoft.com/office/powerpoint/2010/main" val="1947993787"/>
       </p:ext>
     </p:extLst>
   </p:cSld>
@@ -5473,23 +5316,31 @@
           <a:p>
             <a:r>
               <a:rPr lang="de-DE" dirty="0" err="1" smtClean="0"/>
-              <a:t>Practical</a:t>
-            </a:r>
-            <a:r>
-              <a:rPr lang="de-DE" dirty="0" smtClean="0"/>
-              <a:t> </a:t>
-            </a:r>
-            <a:r>
-              <a:rPr lang="de-DE" dirty="0" err="1" smtClean="0"/>
-              <a:t>settings</a:t>
-            </a:r>
-            <a:r>
-              <a:rPr lang="de-DE" dirty="0" smtClean="0"/>
-              <a:t> – still </a:t>
-            </a:r>
-            <a:r>
-              <a:rPr lang="de-DE" dirty="0" err="1" smtClean="0"/>
-              <a:t>missing</a:t>
+              <a:t>Current</a:t>
+            </a:r>
+            <a:r>
+              <a:rPr lang="de-DE" dirty="0" smtClean="0"/>
+              <a:t> </a:t>
+            </a:r>
+            <a:r>
+              <a:rPr lang="de-DE" dirty="0" err="1" smtClean="0"/>
+              <a:t>state</a:t>
+            </a:r>
+            <a:r>
+              <a:rPr lang="de-DE" dirty="0" smtClean="0"/>
+              <a:t> </a:t>
+            </a:r>
+            <a:r>
+              <a:rPr lang="de-DE" dirty="0" err="1" smtClean="0"/>
+              <a:t>as</a:t>
+            </a:r>
+            <a:r>
+              <a:rPr lang="de-DE" dirty="0" smtClean="0"/>
+              <a:t> of 2013/11</a:t>
+            </a:r>
+            <a:r>
+              <a:rPr lang="de-DE" dirty="0" smtClean="0"/>
+              <a:t>/13</a:t>
             </a:r>
             <a:endParaRPr lang="de-DE" dirty="0"/>
           </a:p>
@@ -5507,131 +5358,206 @@
         </p:nvSpPr>
         <p:spPr/>
         <p:txBody>
-          <a:bodyPr>
-            <a:normAutofit fontScale="92500"/>
-          </a:bodyPr>
-          <a:lstStyle/>
-          <a:p>
-            <a:r>
-              <a:rPr lang="de-DE" dirty="0" smtClean="0"/>
-              <a:t>UW, Cyrus</a:t>
-            </a:r>
-          </a:p>
-          <a:p>
-            <a:r>
-              <a:rPr lang="de-DE" dirty="0" smtClean="0"/>
-              <a:t>Exim4</a:t>
-            </a:r>
-          </a:p>
-          <a:p>
-            <a:r>
-              <a:rPr lang="de-DE" dirty="0" err="1" smtClean="0"/>
-              <a:t>OpenVPN</a:t>
-            </a:r>
-            <a:r>
-              <a:rPr lang="de-DE" dirty="0" smtClean="0"/>
-              <a:t> – </a:t>
-            </a:r>
-            <a:r>
-              <a:rPr lang="de-DE" dirty="0" err="1" smtClean="0"/>
-              <a:t>troubles</a:t>
-            </a:r>
-            <a:r>
-              <a:rPr lang="de-DE" dirty="0" smtClean="0"/>
-              <a:t> on </a:t>
-            </a:r>
-            <a:r>
-              <a:rPr lang="de-DE" dirty="0" err="1" smtClean="0"/>
-              <a:t>mac</a:t>
-            </a:r>
-            <a:r>
-              <a:rPr lang="de-DE" dirty="0" smtClean="0"/>
-              <a:t> (</a:t>
-            </a:r>
-            <a:r>
-              <a:rPr lang="de-DE" dirty="0" err="1" smtClean="0"/>
-              <a:t>pepi</a:t>
-            </a:r>
-            <a:r>
-              <a:rPr lang="de-DE" dirty="0" smtClean="0"/>
-              <a:t>)</a:t>
-            </a:r>
-          </a:p>
-          <a:p>
-            <a:r>
-              <a:rPr lang="de-DE" dirty="0" smtClean="0"/>
-              <a:t>IPSec</a:t>
-            </a:r>
-          </a:p>
-          <a:p>
-            <a:r>
-              <a:rPr lang="de-DE" dirty="0" err="1" smtClean="0"/>
-              <a:t>vendor</a:t>
-            </a:r>
-            <a:r>
-              <a:rPr lang="de-DE" dirty="0" smtClean="0"/>
-              <a:t> </a:t>
-            </a:r>
-            <a:r>
-              <a:rPr lang="de-DE" dirty="0" err="1" smtClean="0"/>
-              <a:t>specific</a:t>
-            </a:r>
-            <a:r>
-              <a:rPr lang="de-DE" dirty="0" smtClean="0"/>
-              <a:t> </a:t>
-            </a:r>
-            <a:r>
-              <a:rPr lang="de-DE" dirty="0" err="1" smtClean="0"/>
-              <a:t>applications</a:t>
-            </a:r>
-            <a:r>
-              <a:rPr lang="de-DE" dirty="0" smtClean="0"/>
-              <a:t>: </a:t>
-            </a:r>
-            <a:r>
-              <a:rPr lang="de-DE" dirty="0" err="1" smtClean="0"/>
-              <a:t>Juniper</a:t>
-            </a:r>
-            <a:r>
-              <a:rPr lang="de-DE" dirty="0" smtClean="0"/>
-              <a:t> VPN, Cisco...</a:t>
-            </a:r>
-          </a:p>
-          <a:p>
-            <a:r>
-              <a:rPr lang="de-DE" dirty="0" err="1" smtClean="0"/>
-              <a:t>Proxies</a:t>
-            </a:r>
-            <a:r>
-              <a:rPr lang="de-DE" dirty="0" smtClean="0"/>
-              <a:t> (</a:t>
-            </a:r>
-            <a:r>
-              <a:rPr lang="de-DE" dirty="0" err="1" smtClean="0"/>
-              <a:t>squid</a:t>
-            </a:r>
-            <a:r>
-              <a:rPr lang="de-DE" dirty="0" smtClean="0"/>
-              <a:t>)</a:t>
-            </a:r>
-          </a:p>
-          <a:p>
-            <a:r>
-              <a:rPr lang="de-DE" dirty="0" smtClean="0"/>
-              <a:t>Exchange</a:t>
-            </a:r>
-          </a:p>
-          <a:p>
-            <a:r>
-              <a:rPr lang="de-DE" dirty="0" smtClean="0"/>
-              <a:t>PGP</a:t>
-            </a:r>
-          </a:p>
-          <a:p>
-            <a:pPr marL="0" indent="0">
-              <a:buNone/>
-            </a:pPr>
+          <a:bodyPr/>
+          <a:lstStyle/>
+          <a:p>
+            <a:r>
+              <a:rPr lang="de-DE" dirty="0" smtClean="0"/>
+              <a:t>Initial </a:t>
+            </a:r>
+            <a:r>
+              <a:rPr lang="de-DE" dirty="0" err="1" smtClean="0"/>
+              <a:t>ongoing</a:t>
+            </a:r>
+            <a:r>
+              <a:rPr lang="de-DE" dirty="0" smtClean="0"/>
+              <a:t> </a:t>
+            </a:r>
+            <a:r>
+              <a:rPr lang="de-DE" dirty="0" err="1" smtClean="0"/>
+              <a:t>work</a:t>
+            </a:r>
+            <a:r>
+              <a:rPr lang="de-DE" dirty="0" smtClean="0"/>
+              <a:t> in </a:t>
+            </a:r>
+            <a:r>
+              <a:rPr lang="de-DE" dirty="0" err="1" smtClean="0"/>
+              <a:t>the</a:t>
+            </a:r>
+            <a:r>
+              <a:rPr lang="de-DE" dirty="0" smtClean="0"/>
+              <a:t> </a:t>
+            </a:r>
+            <a:r>
+              <a:rPr lang="de-DE" dirty="0" err="1" smtClean="0"/>
+              <a:t>git</a:t>
+            </a:r>
+            <a:r>
+              <a:rPr lang="de-DE" dirty="0" smtClean="0"/>
+              <a:t> </a:t>
+            </a:r>
+            <a:r>
+              <a:rPr lang="de-DE" dirty="0" err="1" smtClean="0"/>
+              <a:t>repository</a:t>
+            </a:r>
             <a:endParaRPr lang="de-DE" dirty="0" smtClean="0"/>
+          </a:p>
+          <a:p>
+            <a:r>
+              <a:rPr lang="de-DE" dirty="0" smtClean="0"/>
+              <a:t>More </a:t>
+            </a:r>
+            <a:r>
+              <a:rPr lang="de-DE" dirty="0" err="1" smtClean="0"/>
+              <a:t>testing</a:t>
+            </a:r>
+            <a:r>
+              <a:rPr lang="de-DE" dirty="0" smtClean="0"/>
+              <a:t> </a:t>
+            </a:r>
+            <a:r>
+              <a:rPr lang="de-DE" dirty="0" err="1" smtClean="0"/>
+              <a:t>needed</a:t>
+            </a:r>
+            <a:r>
+              <a:rPr lang="de-DE" dirty="0" smtClean="0"/>
+              <a:t>. </a:t>
+            </a:r>
+            <a:r>
+              <a:rPr lang="de-DE" dirty="0" err="1" smtClean="0"/>
+              <a:t>Especially</a:t>
+            </a:r>
+            <a:r>
+              <a:rPr lang="de-DE" dirty="0" smtClean="0"/>
+              <a:t> </a:t>
+            </a:r>
+            <a:r>
+              <a:rPr lang="de-DE" dirty="0" err="1" smtClean="0"/>
+              <a:t>compatibility</a:t>
+            </a:r>
+            <a:r>
+              <a:rPr lang="de-DE" dirty="0" smtClean="0"/>
+              <a:t> </a:t>
+            </a:r>
+            <a:r>
+              <a:rPr lang="de-DE" dirty="0" err="1" smtClean="0"/>
+              <a:t>with</a:t>
+            </a:r>
+            <a:r>
+              <a:rPr lang="de-DE" dirty="0" smtClean="0"/>
+              <a:t> </a:t>
+            </a:r>
+            <a:r>
+              <a:rPr lang="de-DE" dirty="0" err="1" smtClean="0"/>
+              <a:t>clients</a:t>
+            </a:r>
+            <a:r>
+              <a:rPr lang="de-DE" dirty="0" smtClean="0"/>
+              <a:t> </a:t>
+            </a:r>
+            <a:r>
+              <a:rPr lang="de-DE" dirty="0" err="1" smtClean="0"/>
+              <a:t>and</a:t>
+            </a:r>
+            <a:r>
+              <a:rPr lang="de-DE" dirty="0" smtClean="0"/>
+              <a:t> </a:t>
+            </a:r>
+            <a:r>
+              <a:rPr lang="de-DE" dirty="0" err="1" smtClean="0"/>
+              <a:t>when</a:t>
+            </a:r>
+            <a:r>
+              <a:rPr lang="de-DE" dirty="0" smtClean="0"/>
+              <a:t> </a:t>
+            </a:r>
+            <a:r>
+              <a:rPr lang="de-DE" dirty="0" err="1" smtClean="0"/>
+              <a:t>to</a:t>
+            </a:r>
+            <a:r>
+              <a:rPr lang="de-DE" dirty="0" smtClean="0"/>
+              <a:t> </a:t>
+            </a:r>
+            <a:r>
+              <a:rPr lang="de-DE" dirty="0" err="1" smtClean="0"/>
+              <a:t>simply</a:t>
+            </a:r>
+            <a:r>
+              <a:rPr lang="de-DE" dirty="0" smtClean="0"/>
+              <a:t> </a:t>
+            </a:r>
+            <a:r>
+              <a:rPr lang="de-DE" dirty="0" err="1" smtClean="0"/>
+              <a:t>ignore</a:t>
+            </a:r>
+            <a:r>
+              <a:rPr lang="de-DE" dirty="0" smtClean="0"/>
+              <a:t> </a:t>
+            </a:r>
+            <a:r>
+              <a:rPr lang="de-DE" dirty="0" err="1" smtClean="0"/>
+              <a:t>old</a:t>
+            </a:r>
+            <a:r>
+              <a:rPr lang="de-DE" dirty="0" smtClean="0"/>
+              <a:t> </a:t>
+            </a:r>
+            <a:r>
+              <a:rPr lang="de-DE" dirty="0" err="1" smtClean="0"/>
+              <a:t>clients</a:t>
+            </a:r>
+            <a:r>
+              <a:rPr lang="de-DE" dirty="0" smtClean="0"/>
+              <a:t> (RC4,...)</a:t>
+            </a:r>
+          </a:p>
+          <a:p>
+            <a:r>
+              <a:rPr lang="de-DE" dirty="0" smtClean="0"/>
+              <a:t> Need </a:t>
+            </a:r>
+            <a:r>
+              <a:rPr lang="de-DE" dirty="0" err="1" smtClean="0"/>
+              <a:t>to</a:t>
+            </a:r>
+            <a:r>
+              <a:rPr lang="de-DE" dirty="0" smtClean="0"/>
+              <a:t> </a:t>
+            </a:r>
+            <a:r>
+              <a:rPr lang="de-DE" dirty="0" err="1" smtClean="0"/>
+              <a:t>fill</a:t>
+            </a:r>
+            <a:r>
+              <a:rPr lang="de-DE" dirty="0" smtClean="0"/>
+              <a:t> in </a:t>
+            </a:r>
+            <a:r>
+              <a:rPr lang="de-DE" dirty="0" err="1" smtClean="0"/>
+              <a:t>other</a:t>
+            </a:r>
+            <a:r>
+              <a:rPr lang="de-DE" dirty="0" smtClean="0"/>
+              <a:t> </a:t>
+            </a:r>
+            <a:r>
+              <a:rPr lang="de-DE" dirty="0" err="1" smtClean="0"/>
+              <a:t>sections</a:t>
+            </a:r>
+            <a:r>
+              <a:rPr lang="de-DE" dirty="0" smtClean="0"/>
+              <a:t> </a:t>
+            </a:r>
+            <a:r>
+              <a:rPr lang="de-DE" dirty="0" smtClean="0"/>
+              <a:t>(PGP, Exchange server, .</a:t>
+            </a:r>
+            <a:r>
+              <a:rPr lang="de-DE" dirty="0" smtClean="0"/>
+              <a:t>..)</a:t>
+            </a:r>
           </a:p>
           <a:p>
             <a:endParaRPr lang="de-DE" dirty="0"/>
@@ -5641,13 +5567,20 @@
     </p:spTree>
     <p:extLst>
       <p:ext uri="{BB962C8B-B14F-4D97-AF65-F5344CB8AC3E}">
-        <p14:creationId xmlns:p14="http://schemas.microsoft.com/office/powerpoint/2010/main" val="4233437109"/>
+        <p14:creationId xmlns:p14="http://schemas.microsoft.com/office/powerpoint/2010/main" val="51044277"/>
       </p:ext>
     </p:extLst>
   </p:cSld>
   <p:clrMapOvr>
     <a:masterClrMapping/>
   </p:clrMapOvr>
+  <p:timing>
+    <p:tnLst>
+      <p:par>
+        <p:cTn xmlns:p14="http://schemas.microsoft.com/office/powerpoint/2010/main" id="1" dur="indefinite" restart="never" nodeType="tmRoot"/>
+      </p:par>
+    </p:tnLst>
+  </p:timing>
 </p:sld>
 </file>
 
@@ -5680,37 +5613,121 @@
         </p:nvSpPr>
         <p:spPr/>
         <p:txBody>
+          <a:bodyPr/>
+          <a:lstStyle/>
+          <a:p>
+            <a:r>
+              <a:rPr lang="de-DE" dirty="0" err="1" smtClean="0"/>
+              <a:t>Practical</a:t>
+            </a:r>
+            <a:r>
+              <a:rPr lang="de-DE" dirty="0" smtClean="0"/>
+              <a:t> </a:t>
+            </a:r>
+            <a:r>
+              <a:rPr lang="de-DE" dirty="0" err="1" smtClean="0"/>
+              <a:t>settings</a:t>
+            </a:r>
+            <a:r>
+              <a:rPr lang="de-DE" dirty="0" smtClean="0"/>
+              <a:t> – still </a:t>
+            </a:r>
+            <a:r>
+              <a:rPr lang="de-DE" dirty="0" err="1" smtClean="0"/>
+              <a:t>missing</a:t>
+            </a:r>
+            <a:endParaRPr lang="de-DE" dirty="0"/>
+          </a:p>
+        </p:txBody>
+      </p:sp>
+      <p:sp>
+        <p:nvSpPr>
+          <p:cNvPr id="3" name="Inhaltsplatzhalter 2"/>
+          <p:cNvSpPr>
+            <a:spLocks noGrp="1"/>
+          </p:cNvSpPr>
+          <p:nvPr>
+            <p:ph idx="1"/>
+          </p:nvPr>
+        </p:nvSpPr>
+        <p:spPr/>
+        <p:txBody>
           <a:bodyPr>
-            <a:normAutofit/>
+            <a:normAutofit fontScale="92500"/>
           </a:bodyPr>
           <a:lstStyle/>
           <a:p>
             <a:r>
-              <a:rPr lang="de-DE" dirty="0" err="1" smtClean="0"/>
-              <a:t>Participation</a:t>
-            </a:r>
-            <a:endParaRPr lang="de-DE" dirty="0"/>
-          </a:p>
-        </p:txBody>
-      </p:sp>
-      <p:sp>
-        <p:nvSpPr>
-          <p:cNvPr id="3" name="Inhaltsplatzhalter 2"/>
-          <p:cNvSpPr>
-            <a:spLocks noGrp="1"/>
-          </p:cNvSpPr>
-          <p:nvPr>
-            <p:ph idx="1"/>
-          </p:nvPr>
-        </p:nvSpPr>
-        <p:spPr/>
-        <p:txBody>
-          <a:bodyPr/>
-          <a:lstStyle/>
-          <a:p>
-            <a:r>
-              <a:rPr lang="de-DE" dirty="0" err="1" smtClean="0"/>
-              <a:t>Authors</a:t>
+              <a:rPr lang="de-DE" dirty="0" smtClean="0"/>
+              <a:t>UW, Cyrus</a:t>
+            </a:r>
+          </a:p>
+          <a:p>
+            <a:r>
+              <a:rPr lang="de-DE" dirty="0" smtClean="0"/>
+              <a:t>Exim4</a:t>
+            </a:r>
+          </a:p>
+          <a:p>
+            <a:r>
+              <a:rPr lang="de-DE" dirty="0" err="1" smtClean="0"/>
+              <a:t>OpenVPN</a:t>
+            </a:r>
+            <a:r>
+              <a:rPr lang="de-DE" dirty="0" smtClean="0"/>
+              <a:t> – </a:t>
+            </a:r>
+            <a:r>
+              <a:rPr lang="de-DE" dirty="0" err="1" smtClean="0"/>
+              <a:t>troubles</a:t>
+            </a:r>
+            <a:r>
+              <a:rPr lang="de-DE" dirty="0" smtClean="0"/>
+              <a:t> on </a:t>
+            </a:r>
+            <a:r>
+              <a:rPr lang="de-DE" dirty="0" err="1" smtClean="0"/>
+              <a:t>mac</a:t>
+            </a:r>
+            <a:r>
+              <a:rPr lang="de-DE" dirty="0" smtClean="0"/>
+              <a:t> (</a:t>
+            </a:r>
+            <a:r>
+              <a:rPr lang="de-DE" dirty="0" err="1" smtClean="0"/>
+              <a:t>pepi</a:t>
+            </a:r>
+            <a:r>
+              <a:rPr lang="de-DE" dirty="0" smtClean="0"/>
+              <a:t>)</a:t>
+            </a:r>
+          </a:p>
+          <a:p>
+            <a:r>
+              <a:rPr lang="de-DE" dirty="0" smtClean="0"/>
+              <a:t>IPSec</a:t>
+            </a:r>
+          </a:p>
+          <a:p>
+            <a:r>
+              <a:rPr lang="de-DE" dirty="0" err="1" smtClean="0"/>
+              <a:t>vendor</a:t>
+            </a:r>
+            <a:r>
+              <a:rPr lang="de-DE" dirty="0" smtClean="0"/>
+              <a:t> </a:t>
+            </a:r>
+            <a:r>
+              <a:rPr lang="de-DE" dirty="0" err="1" smtClean="0"/>
+              <a:t>specific</a:t>
+            </a:r>
+            <a:r>
+              <a:rPr lang="de-DE" dirty="0" smtClean="0"/>
+              <a:t> </a:t>
+            </a:r>
+            <a:r>
+              <a:rPr lang="de-DE" dirty="0" err="1" smtClean="0"/>
+              <a:t>applications</a:t>
             </a:r>
             <a:r>
               <a:rPr lang="de-DE" dirty="0" smtClean="0"/>
@@ -5718,126 +5735,50 @@
             </a:r>
             <a:r>
               <a:rPr lang="de-DE" dirty="0" err="1" smtClean="0"/>
-              <a:t>cryptologists</a:t>
-            </a:r>
-            <a:r>
-              <a:rPr lang="de-DE" dirty="0" smtClean="0"/>
-              <a:t>, sysadmins, </a:t>
-            </a:r>
-            <a:r>
-              <a:rPr lang="de-DE" dirty="0" err="1" smtClean="0"/>
-              <a:t>hackers</a:t>
-            </a:r>
+              <a:t>Juniper</a:t>
+            </a:r>
+            <a:r>
+              <a:rPr lang="de-DE" dirty="0" smtClean="0"/>
+              <a:t> VPN, Cisco...</a:t>
+            </a:r>
+          </a:p>
+          <a:p>
+            <a:r>
+              <a:rPr lang="de-DE" dirty="0" err="1" smtClean="0"/>
+              <a:t>Proxies</a:t>
+            </a:r>
+            <a:r>
+              <a:rPr lang="de-DE" dirty="0" smtClean="0"/>
+              <a:t> (</a:t>
+            </a:r>
+            <a:r>
+              <a:rPr lang="de-DE" dirty="0" err="1" smtClean="0"/>
+              <a:t>squid</a:t>
+            </a:r>
+            <a:r>
+              <a:rPr lang="de-DE" dirty="0" smtClean="0"/>
+              <a:t>)</a:t>
+            </a:r>
+          </a:p>
+          <a:p>
+            <a:r>
+              <a:rPr lang="de-DE" dirty="0" smtClean="0"/>
+              <a:t>Exchange</a:t>
+            </a:r>
+          </a:p>
+          <a:p>
+            <a:r>
+              <a:rPr lang="de-DE" dirty="0" smtClean="0"/>
+              <a:t>PGP</a:t>
+            </a:r>
+          </a:p>
+          <a:p>
+            <a:pPr marL="0" indent="0">
+              <a:buNone/>
+            </a:pPr>
             <a:endParaRPr lang="de-DE" dirty="0" smtClean="0"/>
           </a:p>
           <a:p>
-            <a:r>
-              <a:rPr lang="de-DE" dirty="0" err="1" smtClean="0"/>
-              <a:t>Apply</a:t>
-            </a:r>
-            <a:r>
-              <a:rPr lang="de-DE" dirty="0" smtClean="0"/>
-              <a:t> </a:t>
-            </a:r>
-            <a:r>
-              <a:rPr lang="de-DE" dirty="0" err="1" smtClean="0"/>
-              <a:t>for</a:t>
-            </a:r>
-            <a:r>
-              <a:rPr lang="de-DE" dirty="0" smtClean="0"/>
-              <a:t> </a:t>
-            </a:r>
-            <a:r>
-              <a:rPr lang="de-DE" dirty="0" err="1" smtClean="0"/>
-              <a:t>write</a:t>
-            </a:r>
-            <a:r>
-              <a:rPr lang="de-DE" dirty="0" smtClean="0"/>
-              <a:t>-perms</a:t>
-            </a:r>
-          </a:p>
-          <a:p>
-            <a:r>
-              <a:rPr lang="de-DE" dirty="0" smtClean="0"/>
-              <a:t>World-</a:t>
-            </a:r>
-            <a:r>
-              <a:rPr lang="de-DE" dirty="0" err="1" smtClean="0"/>
-              <a:t>readable</a:t>
-            </a:r>
-            <a:endParaRPr lang="de-DE" dirty="0" smtClean="0"/>
-          </a:p>
-          <a:p>
-            <a:r>
-              <a:rPr lang="de-DE" dirty="0" smtClean="0"/>
-              <a:t>Variantes: </a:t>
-            </a:r>
-          </a:p>
-          <a:p>
-            <a:pPr lvl="1"/>
-            <a:r>
-              <a:rPr lang="de-DE" dirty="0" smtClean="0"/>
-              <a:t>(A) </a:t>
-            </a:r>
-            <a:r>
-              <a:rPr lang="de-DE" dirty="0" err="1" smtClean="0"/>
-              <a:t>reviewer</a:t>
-            </a:r>
-            <a:r>
-              <a:rPr lang="de-DE" dirty="0" smtClean="0"/>
-              <a:t>: </a:t>
-            </a:r>
-            <a:r>
-              <a:rPr lang="de-DE" dirty="0" err="1" smtClean="0"/>
-              <a:t>the</a:t>
-            </a:r>
-            <a:r>
-              <a:rPr lang="de-DE" dirty="0" smtClean="0"/>
-              <a:t> </a:t>
-            </a:r>
-            <a:r>
-              <a:rPr lang="de-DE" dirty="0" err="1" smtClean="0"/>
-              <a:t>harder</a:t>
-            </a:r>
-            <a:r>
-              <a:rPr lang="de-DE" dirty="0" smtClean="0"/>
-              <a:t> </a:t>
-            </a:r>
-            <a:r>
-              <a:rPr lang="de-DE" dirty="0" err="1" smtClean="0"/>
-              <a:t>job</a:t>
-            </a:r>
-            <a:r>
-              <a:rPr lang="de-DE" dirty="0" smtClean="0"/>
-              <a:t> ;-)</a:t>
-            </a:r>
-          </a:p>
-          <a:p>
-            <a:pPr lvl="1"/>
-            <a:r>
-              <a:rPr lang="de-DE" dirty="0" smtClean="0"/>
-              <a:t>(B) </a:t>
-            </a:r>
-            <a:r>
-              <a:rPr lang="de-DE" dirty="0" err="1" smtClean="0"/>
-              <a:t>co-author</a:t>
-            </a:r>
-            <a:r>
-              <a:rPr lang="de-DE" dirty="0" smtClean="0"/>
-              <a:t>: </a:t>
-            </a:r>
-            <a:r>
-              <a:rPr lang="de-DE" dirty="0" err="1" smtClean="0"/>
-              <a:t>add</a:t>
-            </a:r>
-            <a:r>
-              <a:rPr lang="de-DE" dirty="0" smtClean="0"/>
-              <a:t> a </a:t>
-            </a:r>
-            <a:r>
-              <a:rPr lang="de-DE" dirty="0" err="1" smtClean="0"/>
-              <a:t>section</a:t>
-            </a:r>
             <a:endParaRPr lang="de-DE" dirty="0"/>
           </a:p>
         </p:txBody>
@@ -5845,7 +5786,7 @@
     </p:spTree>
     <p:extLst>
       <p:ext uri="{BB962C8B-B14F-4D97-AF65-F5344CB8AC3E}">
-        <p14:creationId xmlns:p14="http://schemas.microsoft.com/office/powerpoint/2010/main" val="976292356"/>
+        <p14:creationId xmlns:p14="http://schemas.microsoft.com/office/powerpoint/2010/main" val="4233437109"/>
       </p:ext>
     </p:extLst>
   </p:cSld>
@@ -5891,106 +5832,164 @@
         </p:nvSpPr>
         <p:spPr/>
         <p:txBody>
+          <a:bodyPr>
+            <a:normAutofit/>
+          </a:bodyPr>
+          <a:lstStyle/>
+          <a:p>
+            <a:r>
+              <a:rPr lang="de-DE" dirty="0" err="1" smtClean="0"/>
+              <a:t>Participation</a:t>
+            </a:r>
+            <a:endParaRPr lang="de-DE" dirty="0"/>
+          </a:p>
+        </p:txBody>
+      </p:sp>
+      <p:sp>
+        <p:nvSpPr>
+          <p:cNvPr id="3" name="Inhaltsplatzhalter 2"/>
+          <p:cNvSpPr>
+            <a:spLocks noGrp="1"/>
+          </p:cNvSpPr>
+          <p:nvPr>
+            <p:ph idx="1"/>
+          </p:nvPr>
+        </p:nvSpPr>
+        <p:spPr/>
+        <p:txBody>
           <a:bodyPr/>
           <a:lstStyle/>
           <a:p>
             <a:r>
-              <a:rPr lang="de-DE" dirty="0" smtClean="0"/>
-              <a:t>Links</a:t>
-            </a:r>
-            <a:endParaRPr lang="de-DE" dirty="0"/>
-          </a:p>
-        </p:txBody>
-      </p:sp>
-      <p:sp>
-        <p:nvSpPr>
-          <p:cNvPr id="3" name="Inhaltsplatzhalter 2"/>
-          <p:cNvSpPr>
-            <a:spLocks noGrp="1"/>
-          </p:cNvSpPr>
-          <p:nvPr>
-            <p:ph idx="1"/>
-          </p:nvPr>
-        </p:nvSpPr>
-        <p:spPr/>
-        <p:txBody>
-          <a:bodyPr/>
-          <a:lstStyle/>
-          <a:p>
-            <a:r>
-              <a:rPr lang="de-DE" dirty="0" smtClean="0"/>
-              <a:t>Website: </a:t>
-            </a:r>
-            <a:r>
-              <a:rPr lang="de-DE" dirty="0" smtClean="0">
-                <a:hlinkClick r:id="rId2"/>
-              </a:rPr>
-              <a:t>www.bettercrypto.org</a:t>
+              <a:rPr lang="de-DE" dirty="0" err="1" smtClean="0"/>
+              <a:t>Authors</a:t>
+            </a:r>
+            <a:r>
+              <a:rPr lang="de-DE" dirty="0" smtClean="0"/>
+              <a:t>: </a:t>
+            </a:r>
+            <a:r>
+              <a:rPr lang="de-DE" dirty="0" err="1" smtClean="0"/>
+              <a:t>cryptologists</a:t>
+            </a:r>
+            <a:r>
+              <a:rPr lang="de-DE" dirty="0" smtClean="0"/>
+              <a:t>, sysadmins, </a:t>
+            </a:r>
+            <a:r>
+              <a:rPr lang="de-DE" dirty="0" err="1" smtClean="0"/>
+              <a:t>hackers</a:t>
             </a:r>
             <a:endParaRPr lang="de-DE" dirty="0" smtClean="0"/>
           </a:p>
           <a:p>
             <a:r>
               <a:rPr lang="de-DE" dirty="0" err="1" smtClean="0"/>
-              <a:t>Git</a:t>
-            </a:r>
-            <a:r>
-              <a:rPr lang="de-DE" dirty="0" smtClean="0"/>
-              <a:t> </a:t>
-            </a:r>
-            <a:r>
-              <a:rPr lang="de-DE" dirty="0" err="1" smtClean="0"/>
-              <a:t>repo</a:t>
+              <a:t>Apply</a:t>
+            </a:r>
+            <a:r>
+              <a:rPr lang="de-DE" dirty="0" smtClean="0"/>
+              <a:t> </a:t>
+            </a:r>
+            <a:r>
+              <a:rPr lang="de-DE" dirty="0" err="1" smtClean="0"/>
+              <a:t>for</a:t>
+            </a:r>
+            <a:r>
+              <a:rPr lang="de-DE" dirty="0" smtClean="0"/>
+              <a:t> </a:t>
+            </a:r>
+            <a:r>
+              <a:rPr lang="de-DE" dirty="0" err="1" smtClean="0"/>
+              <a:t>write</a:t>
+            </a:r>
+            <a:r>
+              <a:rPr lang="de-DE" dirty="0" smtClean="0"/>
+              <a:t>-perms</a:t>
+            </a:r>
+          </a:p>
+          <a:p>
+            <a:r>
+              <a:rPr lang="de-DE" dirty="0" smtClean="0"/>
+              <a:t>World-</a:t>
+            </a:r>
+            <a:r>
+              <a:rPr lang="de-DE" dirty="0" err="1" smtClean="0"/>
+              <a:t>readable</a:t>
+            </a:r>
+            <a:endParaRPr lang="de-DE" dirty="0" smtClean="0"/>
+          </a:p>
+          <a:p>
+            <a:r>
+              <a:rPr lang="de-DE" dirty="0" smtClean="0"/>
+              <a:t>Variantes: </a:t>
+            </a:r>
+          </a:p>
+          <a:p>
+            <a:pPr lvl="1"/>
+            <a:r>
+              <a:rPr lang="de-DE" dirty="0" smtClean="0"/>
+              <a:t>(A) </a:t>
+            </a:r>
+            <a:r>
+              <a:rPr lang="de-DE" dirty="0" err="1" smtClean="0"/>
+              <a:t>reviewer</a:t>
             </a:r>
             <a:r>
               <a:rPr lang="de-DE" dirty="0" smtClean="0"/>
               <a:t>: </a:t>
             </a:r>
             <a:r>
-              <a:rPr lang="de-DE" dirty="0" smtClean="0">
-                <a:hlinkClick r:id="rId3"/>
-              </a:rPr>
-              <a:t>https://git.bettercrypto.org</a:t>
-            </a:r>
-            <a:endParaRPr lang="de-DE" dirty="0" smtClean="0"/>
-          </a:p>
-          <a:p>
-            <a:r>
-              <a:rPr lang="de-DE" dirty="0" smtClean="0"/>
-              <a:t>Mailing </a:t>
-            </a:r>
-            <a:r>
-              <a:rPr lang="de-DE" dirty="0" err="1" smtClean="0"/>
-              <a:t>list</a:t>
-            </a:r>
-            <a:r>
-              <a:rPr lang="de-DE" dirty="0"/>
+              <a:rPr lang="de-DE" dirty="0" err="1" smtClean="0"/>
+              <a:t>the</a:t>
+            </a:r>
+            <a:r>
+              <a:rPr lang="de-DE" dirty="0" smtClean="0"/>
+              <a:t> </a:t>
+            </a:r>
+            <a:r>
+              <a:rPr lang="de-DE" dirty="0" err="1" smtClean="0"/>
+              <a:t>harder</a:t>
+            </a:r>
+            <a:r>
+              <a:rPr lang="de-DE" dirty="0" smtClean="0"/>
+              <a:t> </a:t>
+            </a:r>
+            <a:r>
+              <a:rPr lang="de-DE" dirty="0" err="1" smtClean="0"/>
+              <a:t>job</a:t>
+            </a:r>
+            <a:r>
+              <a:rPr lang="de-DE" dirty="0" smtClean="0"/>
+              <a:t> ;-)</a:t>
+            </a:r>
+          </a:p>
+          <a:p>
+            <a:pPr lvl="1"/>
+            <a:r>
+              <a:rPr lang="de-DE" dirty="0" smtClean="0"/>
+              <a:t>(B) </a:t>
+            </a:r>
+            <a:r>
+              <a:rPr lang="de-DE" dirty="0" err="1" smtClean="0"/>
+              <a:t>co-author</a:t>
+            </a:r>
+            <a:r>
+              <a:rPr lang="de-DE" dirty="0" smtClean="0"/>
               <a:t>: </a:t>
             </a:r>
             <a:r>
-              <a:rPr lang="de-DE" dirty="0" smtClean="0">
-                <a:hlinkClick r:id="rId4"/>
-              </a:rPr>
-              <a:t>http://lists.cert.at</a:t>
-            </a:r>
-            <a:r>
-              <a:rPr lang="de-DE" dirty="0">
-                <a:hlinkClick r:id="rId4"/>
-              </a:rPr>
-              <a:t>/cgi-bin/mailman/listinfo/</a:t>
-            </a:r>
-            <a:r>
-              <a:rPr lang="de-DE" dirty="0" smtClean="0">
-                <a:hlinkClick r:id="rId4"/>
-              </a:rPr>
-              <a:t>ach</a:t>
-            </a:r>
-            <a:r>
-              <a:rPr lang="de-DE" dirty="0" smtClean="0"/>
-              <a:t> </a:t>
-            </a:r>
-          </a:p>
-          <a:p>
+              <a:rPr lang="de-DE" dirty="0" err="1" smtClean="0"/>
+              <a:t>add</a:t>
+            </a:r>
+            <a:r>
+              <a:rPr lang="de-DE" dirty="0" smtClean="0"/>
+              <a:t> a </a:t>
+            </a:r>
+            <a:r>
+              <a:rPr lang="de-DE" dirty="0" err="1" smtClean="0"/>
+              <a:t>section</a:t>
+            </a:r>
             <a:endParaRPr lang="de-DE" dirty="0"/>
           </a:p>
         </p:txBody>
@@ -5998,13 +5997,20 @@
     </p:spTree>
     <p:extLst>
       <p:ext uri="{BB962C8B-B14F-4D97-AF65-F5344CB8AC3E}">
-        <p14:creationId xmlns:p14="http://schemas.microsoft.com/office/powerpoint/2010/main" val="665888502"/>
+        <p14:creationId xmlns:p14="http://schemas.microsoft.com/office/powerpoint/2010/main" val="976292356"/>
       </p:ext>
     </p:extLst>
   </p:cSld>
   <p:clrMapOvr>
     <a:masterClrMapping/>
   </p:clrMapOvr>
+  <p:timing>
+    <p:tnLst>
+      <p:par>
+        <p:cTn xmlns:p14="http://schemas.microsoft.com/office/powerpoint/2010/main" id="1" dur="indefinite" restart="never" nodeType="tmRoot"/>
+      </p:par>
+    </p:tnLst>
+  </p:timing>
 </p:sld>
 </file>
 
@@ -6032,6 +6038,159 @@
             <a:spLocks noGrp="1"/>
           </p:cNvSpPr>
           <p:nvPr>
+            <p:ph type="title"/>
+          </p:nvPr>
+        </p:nvSpPr>
+        <p:spPr/>
+        <p:txBody>
+          <a:bodyPr/>
+          <a:lstStyle/>
+          <a:p>
+            <a:r>
+              <a:rPr lang="de-DE" dirty="0" smtClean="0"/>
+              <a:t>Links</a:t>
+            </a:r>
+            <a:endParaRPr lang="de-DE" dirty="0"/>
+          </a:p>
+        </p:txBody>
+      </p:sp>
+      <p:sp>
+        <p:nvSpPr>
+          <p:cNvPr id="3" name="Inhaltsplatzhalter 2"/>
+          <p:cNvSpPr>
+            <a:spLocks noGrp="1"/>
+          </p:cNvSpPr>
+          <p:nvPr>
+            <p:ph idx="1"/>
+          </p:nvPr>
+        </p:nvSpPr>
+        <p:spPr/>
+        <p:txBody>
+          <a:bodyPr/>
+          <a:lstStyle/>
+          <a:p>
+            <a:r>
+              <a:rPr lang="de-DE" dirty="0" smtClean="0"/>
+              <a:t>Website: </a:t>
+            </a:r>
+            <a:r>
+              <a:rPr lang="de-DE" dirty="0" smtClean="0">
+                <a:hlinkClick r:id="rId2"/>
+              </a:rPr>
+              <a:t>www.bettercrypto.org</a:t>
+            </a:r>
+            <a:endParaRPr lang="de-DE" dirty="0" smtClean="0"/>
+          </a:p>
+          <a:p>
+            <a:r>
+              <a:rPr lang="de-DE" dirty="0" err="1" smtClean="0"/>
+              <a:t>Git</a:t>
+            </a:r>
+            <a:r>
+              <a:rPr lang="de-DE" dirty="0" smtClean="0"/>
+              <a:t> </a:t>
+            </a:r>
+            <a:r>
+              <a:rPr lang="de-DE" dirty="0" err="1" smtClean="0"/>
+              <a:t>repo</a:t>
+            </a:r>
+            <a:r>
+              <a:rPr lang="de-DE" dirty="0" smtClean="0"/>
+              <a:t>: </a:t>
+            </a:r>
+            <a:r>
+              <a:rPr lang="de-DE" dirty="0" smtClean="0">
+                <a:hlinkClick r:id="rId3"/>
+              </a:rPr>
+              <a:t>https://git.bettercrypto.org</a:t>
+            </a:r>
+            <a:endParaRPr lang="de-DE" dirty="0" smtClean="0"/>
+          </a:p>
+          <a:p>
+            <a:r>
+              <a:rPr lang="de-DE" dirty="0" smtClean="0"/>
+              <a:t>Mailing </a:t>
+            </a:r>
+            <a:r>
+              <a:rPr lang="de-DE" dirty="0" err="1" smtClean="0"/>
+              <a:t>list</a:t>
+            </a:r>
+            <a:r>
+              <a:rPr lang="de-DE" dirty="0"/>
+              <a:t>: </a:t>
+            </a:r>
+            <a:r>
+              <a:rPr lang="de-DE" dirty="0" smtClean="0">
+                <a:hlinkClick r:id="rId4"/>
+              </a:rPr>
+              <a:t>http://lists.cert.at</a:t>
+            </a:r>
+            <a:r>
+              <a:rPr lang="de-DE" dirty="0">
+                <a:hlinkClick r:id="rId4"/>
+              </a:rPr>
+              <a:t>/cgi-bin/mailman/listinfo/</a:t>
+            </a:r>
+            <a:r>
+              <a:rPr lang="de-DE" dirty="0" smtClean="0">
+                <a:hlinkClick r:id="rId4"/>
+              </a:rPr>
+              <a:t>ach</a:t>
+            </a:r>
+            <a:r>
+              <a:rPr lang="de-DE" dirty="0" smtClean="0"/>
+              <a:t> </a:t>
+            </a:r>
+          </a:p>
+          <a:p>
+            <a:endParaRPr lang="de-DE" dirty="0"/>
+          </a:p>
+        </p:txBody>
+      </p:sp>
+    </p:spTree>
+    <p:extLst>
+      <p:ext uri="{BB962C8B-B14F-4D97-AF65-F5344CB8AC3E}">
+        <p14:creationId xmlns:p14="http://schemas.microsoft.com/office/powerpoint/2010/main" val="665888502"/>
+      </p:ext>
+    </p:extLst>
+  </p:cSld>
+  <p:clrMapOvr>
+    <a:masterClrMapping/>
+  </p:clrMapOvr>
+  <p:timing>
+    <p:tnLst>
+      <p:par>
+        <p:cTn xmlns:p14="http://schemas.microsoft.com/office/powerpoint/2010/main" id="1" dur="indefinite" restart="never" nodeType="tmRoot"/>
+      </p:par>
+    </p:tnLst>
+  </p:timing>
+</p:sld>
+</file>
+
+<file path=ppt/slides/slide25.xml><?xml version="1.0" encoding="utf-8"?>
+<p:sld xmlns:a="http://schemas.openxmlformats.org/drawingml/2006/main" xmlns:r="http://schemas.openxmlformats.org/officeDocument/2006/relationships" xmlns:p="http://schemas.openxmlformats.org/presentationml/2006/main">
+  <p:cSld>
+    <p:spTree>
+      <p:nvGrpSpPr>
+        <p:cNvPr id="1" name=""/>
+        <p:cNvGrpSpPr/>
+        <p:nvPr/>
+      </p:nvGrpSpPr>
+      <p:grpSpPr>
+        <a:xfrm>
+          <a:off x="0" y="0"/>
+          <a:ext cx="0" cy="0"/>
+          <a:chOff x="0" y="0"/>
+          <a:chExt cx="0" cy="0"/>
+        </a:xfrm>
+      </p:grpSpPr>
+      <p:sp>
+        <p:nvSpPr>
+          <p:cNvPr id="2" name="Titel 1"/>
+          <p:cNvSpPr>
+            <a:spLocks noGrp="1"/>
+          </p:cNvSpPr>
+          <p:nvPr>
             <p:ph type="ctrTitle"/>
           </p:nvPr>
         </p:nvSpPr>
@@ -6204,6 +6363,13 @@
   <p:clrMapOvr>
     <a:masterClrMapping/>
   </p:clrMapOvr>
+  <p:timing>
+    <p:tnLst>
+      <p:par>
+        <p:cTn xmlns:p14="http://schemas.microsoft.com/office/powerpoint/2010/main" id="1" dur="indefinite" restart="never" nodeType="tmRoot"/>
+      </p:par>
+    </p:tnLst>
+  </p:timing>
 </p:sld>
 </file>
 
@@ -7525,6 +7691,13 @@
   <p:clrMapOvr>
     <a:masterClrMapping/>
   </p:clrMapOvr>
+  <p:timing>
+    <p:tnLst>
+      <p:par>
+        <p:cTn xmlns:p14="http://schemas.microsoft.com/office/powerpoint/2010/main" id="1" dur="indefinite" restart="never" nodeType="tmRoot"/>
+      </p:par>
+    </p:tnLst>
+  </p:timing>
 </p:sld>
 </file>
 
@@ -7601,6 +7774,13 @@
   <p:clrMapOvr>
     <a:masterClrMapping/>
   </p:clrMapOvr>
+  <p:timing>
+    <p:tnLst>
+      <p:par>
+        <p:cTn xmlns:p14="http://schemas.microsoft.com/office/powerpoint/2010/main" id="1" dur="indefinite" restart="never" nodeType="tmRoot"/>
+      </p:par>
+    </p:tnLst>
+  </p:timing>
 </p:sld>
 </file>
 
@@ -7677,6 +7857,13 @@
   <p:clrMapOvr>
     <a:masterClrMapping/>
   </p:clrMapOvr>
+  <p:timing>
+    <p:tnLst>
+      <p:par>
+        <p:cTn xmlns:p14="http://schemas.microsoft.com/office/powerpoint/2010/main" id="1" dur="indefinite" restart="never" nodeType="tmRoot"/>
+      </p:par>
+    </p:tnLst>
+  </p:timing>
 </p:sld>
 </file>
 
@@ -7714,19 +7901,15 @@
           <a:p>
             <a:r>
               <a:rPr lang="de-DE" dirty="0" err="1" smtClean="0"/>
-              <a:t>Some</a:t>
-            </a:r>
-            <a:r>
-              <a:rPr lang="de-DE" dirty="0" smtClean="0"/>
-              <a:t> </a:t>
-            </a:r>
-            <a:r>
-              <a:rPr lang="de-DE" dirty="0" err="1" smtClean="0"/>
-              <a:t>thoughts</a:t>
-            </a:r>
-            <a:r>
-              <a:rPr lang="de-DE" dirty="0" smtClean="0"/>
-              <a:t> on ECC</a:t>
+              <a:t>Previous</a:t>
+            </a:r>
+            <a:r>
+              <a:rPr lang="de-DE" dirty="0" smtClean="0"/>
+              <a:t> </a:t>
+            </a:r>
+            <a:r>
+              <a:rPr lang="de-DE" dirty="0" err="1" smtClean="0"/>
+              <a:t>work</a:t>
             </a:r>
             <a:endParaRPr lang="de-DE" dirty="0"/>
           </a:p>
@@ -7734,39 +7917,262 @@
       </p:sp>
       <p:sp>
         <p:nvSpPr>
-          <p:cNvPr id="3" name="Inhaltsplatzhalter 2"/>
-          <p:cNvSpPr>
-            <a:spLocks noGrp="1"/>
-          </p:cNvSpPr>
-          <p:nvPr>
-            <p:ph type="body" idx="1"/>
-          </p:nvPr>
-        </p:nvSpPr>
-        <p:spPr/>
-        <p:txBody>
-          <a:bodyPr/>
-          <a:lstStyle/>
-          <a:p>
-            <a:r>
-              <a:rPr lang="de-DE" dirty="0" smtClean="0"/>
-              <a:t>(</a:t>
-            </a:r>
-            <a:r>
-              <a:rPr lang="de-DE" dirty="0" err="1" smtClean="0"/>
-              <a:t>Azet</a:t>
-            </a:r>
-            <a:r>
-              <a:rPr lang="de-DE" dirty="0" smtClean="0"/>
-              <a:t>)</a:t>
+          <p:cNvPr id="3" name="Textplatzhalter 2"/>
+          <p:cNvSpPr>
+            <a:spLocks noGrp="1"/>
+          </p:cNvSpPr>
+          <p:nvPr>
+            <p:ph idx="1"/>
+          </p:nvPr>
+        </p:nvSpPr>
+        <p:spPr/>
+        <p:txBody>
+          <a:bodyPr>
+            <a:normAutofit fontScale="77500" lnSpcReduction="20000"/>
+          </a:bodyPr>
+          <a:lstStyle/>
+          <a:p>
+            <a:r>
+              <a:rPr lang="de-DE" dirty="0" smtClean="0"/>
+              <a:t>(Aaron)</a:t>
+            </a:r>
+          </a:p>
+          <a:p>
+            <a:r>
+              <a:rPr lang="de-DE" dirty="0" err="1" smtClean="0"/>
+              <a:t>Qualys</a:t>
+            </a:r>
+            <a:r>
+              <a:rPr lang="de-DE" dirty="0" smtClean="0"/>
+              <a:t> </a:t>
+            </a:r>
+            <a:r>
+              <a:rPr lang="de-DE" dirty="0" err="1" smtClean="0"/>
+              <a:t>blog</a:t>
+            </a:r>
+            <a:r>
+              <a:rPr lang="de-DE" dirty="0" smtClean="0"/>
+              <a:t> / </a:t>
+            </a:r>
+            <a:r>
+              <a:rPr lang="de-DE" dirty="0" err="1" smtClean="0"/>
+              <a:t>book</a:t>
+            </a:r>
+            <a:r>
+              <a:rPr lang="de-DE" dirty="0" smtClean="0"/>
+              <a:t> (Ivan </a:t>
+            </a:r>
+            <a:r>
+              <a:rPr lang="de-DE" dirty="0" err="1" smtClean="0"/>
+              <a:t>Rstic</a:t>
+            </a:r>
+            <a:r>
+              <a:rPr lang="de-DE" dirty="0" smtClean="0"/>
+              <a:t>): </a:t>
+            </a:r>
+          </a:p>
+          <a:p>
+            <a:pPr lvl="1"/>
+            <a:r>
+              <a:rPr lang="de-DE" dirty="0"/>
+              <a:t>SSL/TLS </a:t>
+            </a:r>
+            <a:r>
+              <a:rPr lang="de-DE" dirty="0" err="1"/>
+              <a:t>Deployment</a:t>
+            </a:r>
+            <a:r>
+              <a:rPr lang="de-DE" dirty="0"/>
+              <a:t> Best Practices</a:t>
+            </a:r>
+          </a:p>
+          <a:p>
+            <a:pPr lvl="1"/>
+            <a:r>
+              <a:rPr lang="de-DE" dirty="0" err="1"/>
+              <a:t>OpenSSL</a:t>
+            </a:r>
+            <a:r>
+              <a:rPr lang="de-DE" dirty="0"/>
+              <a:t> </a:t>
+            </a:r>
+            <a:r>
+              <a:rPr lang="de-DE" dirty="0" err="1" smtClean="0"/>
+              <a:t>Cookbook</a:t>
+            </a:r>
+            <a:endParaRPr lang="de-DE" dirty="0" smtClean="0"/>
+          </a:p>
+          <a:p>
+            <a:pPr lvl="1"/>
+            <a:endParaRPr lang="de-DE" dirty="0" smtClean="0"/>
+          </a:p>
+          <a:p>
+            <a:r>
+              <a:rPr lang="de-DE" dirty="0" smtClean="0"/>
+              <a:t>ENISA </a:t>
+            </a:r>
+            <a:r>
+              <a:rPr lang="de-DE" dirty="0" err="1" smtClean="0"/>
+              <a:t>recommendations</a:t>
+            </a:r>
+            <a:r>
+              <a:rPr lang="de-DE" dirty="0"/>
+              <a:t>: </a:t>
+            </a:r>
+            <a:br>
+              <a:rPr lang="de-DE" dirty="0"/>
+            </a:br>
+            <a:r>
+              <a:rPr lang="de-DE" dirty="0" err="1"/>
+              <a:t>Algorithms</a:t>
+            </a:r>
+            <a:r>
+              <a:rPr lang="de-DE" dirty="0"/>
+              <a:t>, Key Sizes </a:t>
+            </a:r>
+            <a:r>
+              <a:rPr lang="de-DE" dirty="0" err="1"/>
+              <a:t>and</a:t>
+            </a:r>
+            <a:r>
+              <a:rPr lang="de-DE" dirty="0"/>
+              <a:t> Parameters </a:t>
+            </a:r>
+            <a:r>
+              <a:rPr lang="de-DE" dirty="0" smtClean="0"/>
+              <a:t>Report</a:t>
+            </a:r>
+          </a:p>
+          <a:p>
+            <a:r>
+              <a:rPr lang="de-DE" dirty="0"/>
+              <a:t>BSI: Technische Richtlinie TR-02102-</a:t>
+            </a:r>
+            <a:r>
+              <a:rPr lang="de-DE" dirty="0" smtClean="0"/>
+              <a:t>2, Kryptographische Verfahren: Empfehlungen </a:t>
+            </a:r>
+            <a:r>
+              <a:rPr lang="de-DE" dirty="0"/>
+              <a:t>und </a:t>
+            </a:r>
+            <a:r>
+              <a:rPr lang="de-DE" dirty="0" smtClean="0"/>
+              <a:t>Schlüssellängen. Jan. 2013</a:t>
+            </a:r>
+          </a:p>
+          <a:p>
+            <a:r>
+              <a:rPr lang="de-DE" dirty="0" smtClean="0"/>
+              <a:t>G-</a:t>
+            </a:r>
+            <a:r>
+              <a:rPr lang="de-DE" dirty="0" err="1" smtClean="0"/>
+              <a:t>sec.lu</a:t>
+            </a:r>
+            <a:r>
+              <a:rPr lang="de-DE" dirty="0" smtClean="0"/>
+              <a:t> (</a:t>
+            </a:r>
+            <a:r>
+              <a:rPr lang="de-DE" dirty="0"/>
+              <a:t>Thierry Zoller): TLS/SSL </a:t>
+            </a:r>
+            <a:r>
+              <a:rPr lang="de-DE" dirty="0" err="1"/>
+              <a:t>hardening</a:t>
+            </a:r>
+            <a:r>
+              <a:rPr lang="de-DE" dirty="0"/>
+              <a:t> </a:t>
+            </a:r>
+            <a:r>
+              <a:rPr lang="de-DE" dirty="0" err="1"/>
+              <a:t>and</a:t>
+            </a:r>
+            <a:r>
+              <a:rPr lang="de-DE" dirty="0"/>
+              <a:t> </a:t>
+            </a:r>
+            <a:r>
+              <a:rPr lang="de-DE" dirty="0" err="1" smtClean="0"/>
+              <a:t>compatibility</a:t>
+            </a:r>
+            <a:r>
+              <a:rPr lang="de-DE" dirty="0" smtClean="0"/>
+              <a:t> </a:t>
+            </a:r>
+            <a:r>
+              <a:rPr lang="de-DE" dirty="0"/>
+              <a:t>Report 2011 </a:t>
+            </a:r>
+            <a:endParaRPr lang="de-DE" dirty="0" smtClean="0"/>
+          </a:p>
+          <a:p>
+            <a:r>
+              <a:rPr lang="de-DE" dirty="0"/>
+              <a:t>NIST: </a:t>
+            </a:r>
+            <a:r>
+              <a:rPr lang="de-DE" dirty="0" err="1"/>
+              <a:t>Recommendation</a:t>
+            </a:r>
+            <a:r>
+              <a:rPr lang="de-DE" dirty="0"/>
+              <a:t> </a:t>
+            </a:r>
+            <a:r>
+              <a:rPr lang="de-DE" dirty="0" err="1"/>
+              <a:t>for</a:t>
+            </a:r>
+            <a:r>
+              <a:rPr lang="de-DE" dirty="0"/>
+              <a:t> Key </a:t>
+            </a:r>
+            <a:r>
+              <a:rPr lang="de-DE" dirty="0" smtClean="0"/>
+              <a:t>Management, </a:t>
+            </a:r>
+            <a:r>
+              <a:rPr lang="de-DE" dirty="0" err="1" smtClean="0"/>
+              <a:t>July</a:t>
+            </a:r>
+            <a:r>
+              <a:rPr lang="de-DE" smtClean="0"/>
+              <a:t> 2013</a:t>
             </a:r>
             <a:endParaRPr lang="de-DE" dirty="0"/>
           </a:p>
         </p:txBody>
       </p:sp>
+      <p:pic>
+        <p:nvPicPr>
+          <p:cNvPr id="4" name="Bild 3"/>
+          <p:cNvPicPr>
+            <a:picLocks noChangeAspect="1"/>
+          </p:cNvPicPr>
+          <p:nvPr/>
+        </p:nvPicPr>
+        <p:blipFill>
+          <a:blip r:embed="rId2"/>
+          <a:stretch>
+            <a:fillRect/>
+          </a:stretch>
+        </p:blipFill>
+        <p:spPr>
+          <a:xfrm>
+            <a:off x="6873342" y="1258701"/>
+            <a:ext cx="1813458" cy="2239620"/>
+          </a:xfrm>
+          <a:prstGeom prst="rect">
+            <a:avLst/>
+          </a:prstGeom>
+        </p:spPr>
+      </p:pic>
     </p:spTree>
     <p:extLst>
       <p:ext uri="{BB962C8B-B14F-4D97-AF65-F5344CB8AC3E}">
-        <p14:creationId xmlns:p14="http://schemas.microsoft.com/office/powerpoint/2010/main" val="3561811505"/>
+        <p14:creationId xmlns:p14="http://schemas.microsoft.com/office/powerpoint/2010/main" val="643471971"/>
       </p:ext>
     </p:extLst>
   </p:cSld>

</xml_diff>

<commit_message>
fix presentation: git repo url was wrong
</commit_message>
<xml_diff>
--- a/presentations/20131113 ACH project2.pptx
+++ b/presentations/20131113 ACH project2.pptx
@@ -5,7 +5,7 @@
     <p:sldMasterId id="2147483648" r:id="rId1"/>
   </p:sldMasterIdLst>
   <p:notesMasterIdLst>
-    <p:notesMasterId r:id="rId27"/>
+    <p:notesMasterId r:id="rId28"/>
   </p:notesMasterIdLst>
   <p:sldIdLst>
     <p:sldId id="256" r:id="rId2"/>
@@ -32,7 +32,8 @@
     <p:sldId id="280" r:id="rId23"/>
     <p:sldId id="262" r:id="rId24"/>
     <p:sldId id="275" r:id="rId25"/>
-    <p:sldId id="276" r:id="rId26"/>
+    <p:sldId id="286" r:id="rId26"/>
+    <p:sldId id="276" r:id="rId27"/>
   </p:sldIdLst>
   <p:sldSz cx="9144000" cy="6858000" type="screen4x3"/>
   <p:notesSz cx="6858000" cy="9144000"/>
@@ -216,7 +217,7 @@
           <a:p>
             <a:fld id="{ABD7BA35-4792-AE4F-B7A6-A4BCD39DEB01}" type="datetimeFigureOut">
               <a:rPr lang="de-DE" smtClean="0"/>
-              <a:t>13.11.2013</a:t>
+              <a:t>11/13/13</a:t>
             </a:fld>
             <a:endParaRPr lang="de-DE"/>
           </a:p>
@@ -765,7 +766,7 @@
           <a:p>
             <a:fld id="{8862424E-C109-F440-84A3-689A668A7AFE}" type="datetimeFigureOut">
               <a:rPr lang="de-DE" smtClean="0"/>
-              <a:t>13.11.2013</a:t>
+              <a:t>11/13/13</a:t>
             </a:fld>
             <a:endParaRPr lang="de-DE"/>
           </a:p>
@@ -935,7 +936,7 @@
           <a:p>
             <a:fld id="{8862424E-C109-F440-84A3-689A668A7AFE}" type="datetimeFigureOut">
               <a:rPr lang="de-DE" smtClean="0"/>
-              <a:t>13.11.2013</a:t>
+              <a:t>11/13/13</a:t>
             </a:fld>
             <a:endParaRPr lang="de-DE"/>
           </a:p>
@@ -1115,7 +1116,7 @@
           <a:p>
             <a:fld id="{8862424E-C109-F440-84A3-689A668A7AFE}" type="datetimeFigureOut">
               <a:rPr lang="de-DE" smtClean="0"/>
-              <a:t>13.11.2013</a:t>
+              <a:t>11/13/13</a:t>
             </a:fld>
             <a:endParaRPr lang="de-DE"/>
           </a:p>
@@ -1285,7 +1286,7 @@
           <a:p>
             <a:fld id="{8862424E-C109-F440-84A3-689A668A7AFE}" type="datetimeFigureOut">
               <a:rPr lang="de-DE" smtClean="0"/>
-              <a:t>13.11.2013</a:t>
+              <a:t>11/13/13</a:t>
             </a:fld>
             <a:endParaRPr lang="de-DE"/>
           </a:p>
@@ -1531,7 +1532,7 @@
           <a:p>
             <a:fld id="{8862424E-C109-F440-84A3-689A668A7AFE}" type="datetimeFigureOut">
               <a:rPr lang="de-DE" smtClean="0"/>
-              <a:t>13.11.2013</a:t>
+              <a:t>11/13/13</a:t>
             </a:fld>
             <a:endParaRPr lang="de-DE"/>
           </a:p>
@@ -1819,7 +1820,7 @@
           <a:p>
             <a:fld id="{8862424E-C109-F440-84A3-689A668A7AFE}" type="datetimeFigureOut">
               <a:rPr lang="de-DE" smtClean="0"/>
-              <a:t>13.11.2013</a:t>
+              <a:t>11/13/13</a:t>
             </a:fld>
             <a:endParaRPr lang="de-DE"/>
           </a:p>
@@ -2241,7 +2242,7 @@
           <a:p>
             <a:fld id="{8862424E-C109-F440-84A3-689A668A7AFE}" type="datetimeFigureOut">
               <a:rPr lang="de-DE" smtClean="0"/>
-              <a:t>13.11.2013</a:t>
+              <a:t>11/13/13</a:t>
             </a:fld>
             <a:endParaRPr lang="de-DE"/>
           </a:p>
@@ -2359,7 +2360,7 @@
           <a:p>
             <a:fld id="{8862424E-C109-F440-84A3-689A668A7AFE}" type="datetimeFigureOut">
               <a:rPr lang="de-DE" smtClean="0"/>
-              <a:t>13.11.2013</a:t>
+              <a:t>11/13/13</a:t>
             </a:fld>
             <a:endParaRPr lang="de-DE"/>
           </a:p>
@@ -2454,7 +2455,7 @@
           <a:p>
             <a:fld id="{8862424E-C109-F440-84A3-689A668A7AFE}" type="datetimeFigureOut">
               <a:rPr lang="de-DE" smtClean="0"/>
-              <a:t>13.11.2013</a:t>
+              <a:t>11/13/13</a:t>
             </a:fld>
             <a:endParaRPr lang="de-DE"/>
           </a:p>
@@ -2731,7 +2732,7 @@
           <a:p>
             <a:fld id="{8862424E-C109-F440-84A3-689A668A7AFE}" type="datetimeFigureOut">
               <a:rPr lang="de-DE" smtClean="0"/>
-              <a:t>13.11.2013</a:t>
+              <a:t>11/13/13</a:t>
             </a:fld>
             <a:endParaRPr lang="de-DE"/>
           </a:p>
@@ -2984,7 +2985,7 @@
           <a:p>
             <a:fld id="{8862424E-C109-F440-84A3-689A668A7AFE}" type="datetimeFigureOut">
               <a:rPr lang="de-DE" smtClean="0"/>
-              <a:t>13.11.2013</a:t>
+              <a:t>11/13/13</a:t>
             </a:fld>
             <a:endParaRPr lang="de-DE"/>
           </a:p>
@@ -3197,7 +3198,7 @@
           <a:p>
             <a:fld id="{8862424E-C109-F440-84A3-689A668A7AFE}" type="datetimeFigureOut">
               <a:rPr lang="de-DE" smtClean="0"/>
-              <a:t>13.11.2013</a:t>
+              <a:t>11/13/13</a:t>
             </a:fld>
             <a:endParaRPr lang="de-DE"/>
           </a:p>
@@ -3654,7 +3655,7 @@
   <p:timing>
     <p:tnLst>
       <p:par>
-        <p:cTn id="1" dur="indefinite" restart="never" nodeType="tmRoot"/>
+        <p:cTn xmlns:p14="http://schemas.microsoft.com/office/powerpoint/2010/main" id="1" dur="indefinite" restart="never" nodeType="tmRoot"/>
       </p:par>
     </p:tnLst>
   </p:timing>
@@ -3757,7 +3758,7 @@
   <p:timing>
     <p:tnLst>
       <p:par>
-        <p:cTn id="1" dur="indefinite" restart="never" nodeType="tmRoot"/>
+        <p:cTn xmlns:p14="http://schemas.microsoft.com/office/powerpoint/2010/main" id="1" dur="indefinite" restart="never" nodeType="tmRoot"/>
       </p:par>
     </p:tnLst>
   </p:timing>
@@ -3969,11 +3970,7 @@
           <a:p>
             <a:r>
               <a:rPr lang="de-DE" dirty="0" smtClean="0"/>
-              <a:t>Variant </a:t>
-            </a:r>
-            <a:r>
-              <a:rPr lang="de-DE" dirty="0" smtClean="0"/>
-              <a:t>A: </a:t>
+              <a:t>Variant A: </a:t>
             </a:r>
             <a:r>
               <a:rPr lang="de-DE" dirty="0" err="1" smtClean="0"/>
@@ -4033,6 +4030,36 @@
             <a:endParaRPr lang="de-DE" dirty="0" smtClean="0"/>
           </a:p>
           <a:p>
+            <a:endParaRPr lang="de-DE" dirty="0"/>
+          </a:p>
+        </p:txBody>
+      </p:sp>
+      <p:sp>
+        <p:nvSpPr>
+          <p:cNvPr id="4" name="Textfeld 3"/>
+          <p:cNvSpPr txBox="1"/>
+          <p:nvPr/>
+        </p:nvSpPr>
+        <p:spPr>
+          <a:xfrm>
+            <a:off x="7182856" y="1494060"/>
+            <a:ext cx="1579588" cy="369332"/>
+          </a:xfrm>
+          <a:prstGeom prst="rect">
+            <a:avLst/>
+          </a:prstGeom>
+          <a:noFill/>
+        </p:spPr>
+        <p:txBody>
+          <a:bodyPr wrap="square" rtlCol="0">
+            <a:spAutoFit/>
+          </a:bodyPr>
+          <a:lstStyle/>
+          <a:p>
+            <a:r>
+              <a:rPr lang="de-DE" dirty="0" smtClean="0"/>
+              <a:t>Ramin</a:t>
+            </a:r>
             <a:endParaRPr lang="de-DE" dirty="0"/>
           </a:p>
         </p:txBody>
@@ -4050,7 +4077,7 @@
   <p:timing>
     <p:tnLst>
       <p:par>
-        <p:cTn id="1" dur="indefinite" restart="never" nodeType="tmRoot"/>
+        <p:cTn xmlns:p14="http://schemas.microsoft.com/office/powerpoint/2010/main" id="1" dur="indefinite" restart="never" nodeType="tmRoot"/>
       </p:par>
     </p:tnLst>
   </p:timing>
@@ -4137,7 +4164,7 @@
   <p:timing>
     <p:tnLst>
       <p:par>
-        <p:cTn id="1" dur="indefinite" restart="never" nodeType="tmRoot"/>
+        <p:cTn xmlns:p14="http://schemas.microsoft.com/office/powerpoint/2010/main" id="1" dur="indefinite" restart="never" nodeType="tmRoot"/>
       </p:par>
     </p:tnLst>
   </p:timing>
@@ -4238,7 +4265,7 @@
   <p:timing>
     <p:tnLst>
       <p:par>
-        <p:cTn id="1" dur="indefinite" restart="never" nodeType="tmRoot"/>
+        <p:cTn xmlns:p14="http://schemas.microsoft.com/office/powerpoint/2010/main" id="1" dur="indefinite" restart="never" nodeType="tmRoot"/>
       </p:par>
     </p:tnLst>
   </p:timing>
@@ -4330,7 +4357,7 @@
   <p:timing>
     <p:tnLst>
       <p:par>
-        <p:cTn id="1" dur="indefinite" restart="never" nodeType="tmRoot"/>
+        <p:cTn xmlns:p14="http://schemas.microsoft.com/office/powerpoint/2010/main" id="1" dur="indefinite" restart="never" nodeType="tmRoot"/>
       </p:par>
     </p:tnLst>
   </p:timing>
@@ -4421,7 +4448,7 @@
   <p:timing>
     <p:tnLst>
       <p:par>
-        <p:cTn id="1" dur="indefinite" restart="never" nodeType="tmRoot"/>
+        <p:cTn xmlns:p14="http://schemas.microsoft.com/office/powerpoint/2010/main" id="1" dur="indefinite" restart="never" nodeType="tmRoot"/>
       </p:par>
     </p:tnLst>
   </p:timing>
@@ -4561,7 +4588,7 @@
   <p:timing>
     <p:tnLst>
       <p:par>
-        <p:cTn id="1" dur="indefinite" restart="never" nodeType="tmRoot"/>
+        <p:cTn xmlns:p14="http://schemas.microsoft.com/office/powerpoint/2010/main" id="1" dur="indefinite" restart="never" nodeType="tmRoot"/>
       </p:par>
     </p:tnLst>
   </p:timing>
@@ -4662,7 +4689,7 @@
   <p:timing>
     <p:tnLst>
       <p:par>
-        <p:cTn id="1" dur="indefinite" restart="never" nodeType="tmRoot"/>
+        <p:cTn xmlns:p14="http://schemas.microsoft.com/office/powerpoint/2010/main" id="1" dur="indefinite" restart="never" nodeType="tmRoot"/>
       </p:par>
     </p:tnLst>
   </p:timing>
@@ -4946,7 +4973,7 @@
   <p:timing>
     <p:tnLst>
       <p:par>
-        <p:cTn id="1" dur="indefinite" restart="never" nodeType="tmRoot"/>
+        <p:cTn xmlns:p14="http://schemas.microsoft.com/office/powerpoint/2010/main" id="1" dur="indefinite" restart="never" nodeType="tmRoot"/>
       </p:par>
     </p:tnLst>
   </p:timing>
@@ -5033,7 +5060,7 @@
   <p:timing>
     <p:tnLst>
       <p:par>
-        <p:cTn id="1" dur="indefinite" restart="never" nodeType="tmRoot"/>
+        <p:cTn xmlns:p14="http://schemas.microsoft.com/office/powerpoint/2010/main" id="1" dur="indefinite" restart="never" nodeType="tmRoot"/>
       </p:par>
     </p:tnLst>
   </p:timing>
@@ -5112,7 +5139,7 @@
   <p:timing>
     <p:tnLst>
       <p:par>
-        <p:cTn id="1" dur="indefinite" restart="never" nodeType="tmRoot"/>
+        <p:cTn xmlns:p14="http://schemas.microsoft.com/office/powerpoint/2010/main" id="1" dur="indefinite" restart="never" nodeType="tmRoot"/>
       </p:par>
     </p:tnLst>
   </p:timing>
@@ -5397,7 +5424,7 @@
   <p:timing>
     <p:tnLst>
       <p:par>
-        <p:cTn id="1" dur="indefinite" restart="never" nodeType="tmRoot"/>
+        <p:cTn xmlns:p14="http://schemas.microsoft.com/office/powerpoint/2010/main" id="1" dur="indefinite" restart="never" nodeType="tmRoot"/>
       </p:par>
     </p:tnLst>
   </p:timing>
@@ -5687,7 +5714,7 @@
   <p:timing>
     <p:tnLst>
       <p:par>
-        <p:cTn id="1" dur="indefinite" restart="never" nodeType="tmRoot"/>
+        <p:cTn xmlns:p14="http://schemas.microsoft.com/office/powerpoint/2010/main" id="1" dur="indefinite" restart="never" nodeType="tmRoot"/>
       </p:par>
     </p:tnLst>
   </p:timing>
@@ -5906,7 +5933,7 @@
   <p:timing>
     <p:tnLst>
       <p:par>
-        <p:cTn id="1" dur="indefinite" restart="never" nodeType="tmRoot"/>
+        <p:cTn xmlns:p14="http://schemas.microsoft.com/office/powerpoint/2010/main" id="1" dur="indefinite" restart="never" nodeType="tmRoot"/>
       </p:par>
     </p:tnLst>
   </p:timing>
@@ -6117,7 +6144,7 @@
   <p:timing>
     <p:tnLst>
       <p:par>
-        <p:cTn id="1" dur="indefinite" restart="never" nodeType="tmRoot"/>
+        <p:cTn xmlns:p14="http://schemas.microsoft.com/office/powerpoint/2010/main" id="1" dur="indefinite" restart="never" nodeType="tmRoot"/>
       </p:par>
     </p:tnLst>
   </p:timing>
@@ -6212,7 +6239,13 @@
               <a:rPr lang="de-DE" dirty="0" smtClean="0">
                 <a:hlinkClick r:id="rId3"/>
               </a:rPr>
-              <a:t>https://git.bettercrypto.org</a:t>
+              <a:t>https://</a:t>
+            </a:r>
+            <a:r>
+              <a:rPr lang="de-DE" dirty="0" smtClean="0">
+                <a:hlinkClick r:id="rId3"/>
+              </a:rPr>
+              <a:t>git.bettercrypto.org/ach-master.git</a:t>
             </a:r>
             <a:endParaRPr lang="de-DE" dirty="0" smtClean="0"/>
           </a:p>
@@ -6270,7 +6303,7 @@
   <p:timing>
     <p:tnLst>
       <p:par>
-        <p:cTn id="1" dur="indefinite" restart="never" nodeType="tmRoot"/>
+        <p:cTn xmlns:p14="http://schemas.microsoft.com/office/powerpoint/2010/main" id="1" dur="indefinite" restart="never" nodeType="tmRoot"/>
       </p:par>
     </p:tnLst>
   </p:timing>
@@ -6301,6 +6334,86 @@
             <a:spLocks noGrp="1"/>
           </p:cNvSpPr>
           <p:nvPr>
+            <p:ph type="title"/>
+          </p:nvPr>
+        </p:nvSpPr>
+        <p:spPr/>
+        <p:txBody>
+          <a:bodyPr/>
+          <a:lstStyle/>
+          <a:p>
+            <a:r>
+              <a:rPr lang="de-DE" dirty="0" err="1" smtClean="0"/>
+              <a:t>Git</a:t>
+            </a:r>
+            <a:r>
+              <a:rPr lang="de-DE" dirty="0" smtClean="0"/>
+              <a:t> </a:t>
+            </a:r>
+            <a:r>
+              <a:rPr lang="de-DE" dirty="0" err="1" smtClean="0"/>
+              <a:t>Repo</a:t>
+            </a:r>
+            <a:endParaRPr lang="de-DE" dirty="0"/>
+          </a:p>
+        </p:txBody>
+      </p:sp>
+      <p:pic>
+        <p:nvPicPr>
+          <p:cNvPr id="4" name="Inhaltsplatzhalter 3"/>
+          <p:cNvPicPr>
+            <a:picLocks noGrp="1" noChangeAspect="1"/>
+          </p:cNvPicPr>
+          <p:nvPr>
+            <p:ph idx="1"/>
+          </p:nvPr>
+        </p:nvPicPr>
+        <p:blipFill>
+          <a:blip r:embed="rId2"/>
+          <a:srcRect t="15910" b="15910"/>
+          <a:stretch>
+            <a:fillRect/>
+          </a:stretch>
+        </p:blipFill>
+        <p:spPr/>
+      </p:pic>
+    </p:spTree>
+    <p:extLst>
+      <p:ext uri="{BB962C8B-B14F-4D97-AF65-F5344CB8AC3E}">
+        <p14:creationId xmlns:p14="http://schemas.microsoft.com/office/powerpoint/2010/main" val="1794499352"/>
+      </p:ext>
+    </p:extLst>
+  </p:cSld>
+  <p:clrMapOvr>
+    <a:masterClrMapping/>
+  </p:clrMapOvr>
+</p:sld>
+</file>
+
+<file path=ppt/slides/slide26.xml><?xml version="1.0" encoding="utf-8"?>
+<p:sld xmlns:a="http://schemas.openxmlformats.org/drawingml/2006/main" xmlns:r="http://schemas.openxmlformats.org/officeDocument/2006/relationships" xmlns:p="http://schemas.openxmlformats.org/presentationml/2006/main">
+  <p:cSld>
+    <p:spTree>
+      <p:nvGrpSpPr>
+        <p:cNvPr id="1" name=""/>
+        <p:cNvGrpSpPr/>
+        <p:nvPr/>
+      </p:nvGrpSpPr>
+      <p:grpSpPr>
+        <a:xfrm>
+          <a:off x="0" y="0"/>
+          <a:ext cx="0" cy="0"/>
+          <a:chOff x="0" y="0"/>
+          <a:chExt cx="0" cy="0"/>
+        </a:xfrm>
+      </p:grpSpPr>
+      <p:sp>
+        <p:nvSpPr>
+          <p:cNvPr id="2" name="Titel 1"/>
+          <p:cNvSpPr>
+            <a:spLocks noGrp="1"/>
+          </p:cNvSpPr>
+          <p:nvPr>
             <p:ph type="ctrTitle"/>
           </p:nvPr>
         </p:nvSpPr>
@@ -6476,7 +6589,7 @@
   <p:timing>
     <p:tnLst>
       <p:par>
-        <p:cTn id="1" dur="indefinite" restart="never" nodeType="tmRoot"/>
+        <p:cTn xmlns:p14="http://schemas.microsoft.com/office/powerpoint/2010/main" id="1" dur="indefinite" restart="never" nodeType="tmRoot"/>
       </p:par>
     </p:tnLst>
   </p:timing>
@@ -6631,7 +6744,7 @@
   <p:timing>
     <p:tnLst>
       <p:par>
-        <p:cTn id="1" dur="indefinite" restart="never" nodeType="tmRoot"/>
+        <p:cTn xmlns:p14="http://schemas.microsoft.com/office/powerpoint/2010/main" id="1" dur="indefinite" restart="never" nodeType="tmRoot"/>
       </p:par>
     </p:tnLst>
   </p:timing>
@@ -6784,7 +6897,7 @@
   <p:timing>
     <p:tnLst>
       <p:par>
-        <p:cTn id="1" dur="indefinite" restart="never" nodeType="tmRoot"/>
+        <p:cTn xmlns:p14="http://schemas.microsoft.com/office/powerpoint/2010/main" id="1" dur="indefinite" restart="never" nodeType="tmRoot"/>
       </p:par>
     </p:tnLst>
   </p:timing>
@@ -7642,7 +7755,7 @@
   <p:timing>
     <p:tnLst>
       <p:par>
-        <p:cTn id="1" dur="indefinite" restart="never" nodeType="tmRoot"/>
+        <p:cTn xmlns:p14="http://schemas.microsoft.com/office/powerpoint/2010/main" id="1" dur="indefinite" restart="never" nodeType="tmRoot"/>
       </p:par>
     </p:tnLst>
   </p:timing>
@@ -7803,7 +7916,7 @@
   <p:timing>
     <p:tnLst>
       <p:par>
-        <p:cTn id="1" dur="indefinite" restart="never" nodeType="tmRoot"/>
+        <p:cTn xmlns:p14="http://schemas.microsoft.com/office/powerpoint/2010/main" id="1" dur="indefinite" restart="never" nodeType="tmRoot"/>
       </p:par>
     </p:tnLst>
   </p:timing>
@@ -7886,7 +7999,7 @@
   <p:timing>
     <p:tnLst>
       <p:par>
-        <p:cTn id="1" dur="indefinite" restart="never" nodeType="tmRoot"/>
+        <p:cTn xmlns:p14="http://schemas.microsoft.com/office/powerpoint/2010/main" id="1" dur="indefinite" restart="never" nodeType="tmRoot"/>
       </p:par>
     </p:tnLst>
   </p:timing>
@@ -7969,7 +8082,7 @@
   <p:timing>
     <p:tnLst>
       <p:par>
-        <p:cTn id="1" dur="indefinite" restart="never" nodeType="tmRoot"/>
+        <p:cTn xmlns:p14="http://schemas.microsoft.com/office/powerpoint/2010/main" id="1" dur="indefinite" restart="never" nodeType="tmRoot"/>
       </p:par>
     </p:tnLst>
   </p:timing>

</xml_diff>